<commit_message>
Preprocessing slide wad added.
</commit_message>
<xml_diff>
--- a/project-blue.pptx
+++ b/project-blue.pptx
@@ -12,8 +12,9 @@
     <p:sldId id="265" r:id="rId6"/>
     <p:sldId id="261" r:id="rId7"/>
     <p:sldId id="262" r:id="rId8"/>
-    <p:sldId id="263" r:id="rId9"/>
-    <p:sldId id="264" r:id="rId10"/>
+    <p:sldId id="266" r:id="rId9"/>
+    <p:sldId id="263" r:id="rId10"/>
+    <p:sldId id="264" r:id="rId11"/>
   </p:sldIdLst>
   <p:sldSz cx="9144000" cy="6858000" type="screen4x3"/>
   <p:notesSz cx="6858000" cy="9144000"/>
@@ -296,7 +297,8 @@
           <a:p>
             <a:fld id="{2FFCD221-4BAF-B549-AD57-3A98595157F2}" type="datetimeFigureOut">
               <a:rPr lang="en-US" smtClean="0"/>
-              <a:t>10/17/2016</a:t>
+              <a:pPr/>
+              <a:t>10/31/2016</a:t>
             </a:fld>
             <a:endParaRPr lang="en-US"/>
           </a:p>
@@ -338,6 +340,7 @@
           <a:p>
             <a:fld id="{DB3E6F6E-1DEB-3C44-8B6B-0C5B62F4FAC7}" type="slidenum">
               <a:rPr lang="en-US" smtClean="0"/>
+              <a:pPr/>
               <a:t>‹#›</a:t>
             </a:fld>
             <a:endParaRPr lang="en-US"/>
@@ -347,7 +350,7 @@
     </p:spTree>
     <p:extLst>
       <p:ext uri="{BB962C8B-B14F-4D97-AF65-F5344CB8AC3E}">
-        <p14:creationId xmlns:p14="http://schemas.microsoft.com/office/powerpoint/2010/main" val="2748312729"/>
+        <p14:creationId xmlns:p14="http://schemas.microsoft.com/office/powerpoint/2010/main" xmlns="" val="2748312729"/>
       </p:ext>
     </p:extLst>
   </p:cSld>
@@ -466,7 +469,8 @@
           <a:p>
             <a:fld id="{2FFCD221-4BAF-B549-AD57-3A98595157F2}" type="datetimeFigureOut">
               <a:rPr lang="en-US" smtClean="0"/>
-              <a:t>10/17/2016</a:t>
+              <a:pPr/>
+              <a:t>10/31/2016</a:t>
             </a:fld>
             <a:endParaRPr lang="en-US"/>
           </a:p>
@@ -508,6 +512,7 @@
           <a:p>
             <a:fld id="{DB3E6F6E-1DEB-3C44-8B6B-0C5B62F4FAC7}" type="slidenum">
               <a:rPr lang="en-US" smtClean="0"/>
+              <a:pPr/>
               <a:t>‹#›</a:t>
             </a:fld>
             <a:endParaRPr lang="en-US"/>
@@ -517,7 +522,7 @@
     </p:spTree>
     <p:extLst>
       <p:ext uri="{BB962C8B-B14F-4D97-AF65-F5344CB8AC3E}">
-        <p14:creationId xmlns:p14="http://schemas.microsoft.com/office/powerpoint/2010/main" val="3280191056"/>
+        <p14:creationId xmlns:p14="http://schemas.microsoft.com/office/powerpoint/2010/main" xmlns="" val="3280191056"/>
       </p:ext>
     </p:extLst>
   </p:cSld>
@@ -646,7 +651,8 @@
           <a:p>
             <a:fld id="{2FFCD221-4BAF-B549-AD57-3A98595157F2}" type="datetimeFigureOut">
               <a:rPr lang="en-US" smtClean="0"/>
-              <a:t>10/17/2016</a:t>
+              <a:pPr/>
+              <a:t>10/31/2016</a:t>
             </a:fld>
             <a:endParaRPr lang="en-US"/>
           </a:p>
@@ -688,6 +694,7 @@
           <a:p>
             <a:fld id="{DB3E6F6E-1DEB-3C44-8B6B-0C5B62F4FAC7}" type="slidenum">
               <a:rPr lang="en-US" smtClean="0"/>
+              <a:pPr/>
               <a:t>‹#›</a:t>
             </a:fld>
             <a:endParaRPr lang="en-US"/>
@@ -697,7 +704,7 @@
     </p:spTree>
     <p:extLst>
       <p:ext uri="{BB962C8B-B14F-4D97-AF65-F5344CB8AC3E}">
-        <p14:creationId xmlns:p14="http://schemas.microsoft.com/office/powerpoint/2010/main" val="1172697896"/>
+        <p14:creationId xmlns:p14="http://schemas.microsoft.com/office/powerpoint/2010/main" xmlns="" val="1172697896"/>
       </p:ext>
     </p:extLst>
   </p:cSld>
@@ -816,7 +823,8 @@
           <a:p>
             <a:fld id="{2FFCD221-4BAF-B549-AD57-3A98595157F2}" type="datetimeFigureOut">
               <a:rPr lang="en-US" smtClean="0"/>
-              <a:t>10/17/2016</a:t>
+              <a:pPr/>
+              <a:t>10/31/2016</a:t>
             </a:fld>
             <a:endParaRPr lang="en-US"/>
           </a:p>
@@ -858,6 +866,7 @@
           <a:p>
             <a:fld id="{DB3E6F6E-1DEB-3C44-8B6B-0C5B62F4FAC7}" type="slidenum">
               <a:rPr lang="en-US" smtClean="0"/>
+              <a:pPr/>
               <a:t>‹#›</a:t>
             </a:fld>
             <a:endParaRPr lang="en-US"/>
@@ -867,7 +876,7 @@
     </p:spTree>
     <p:extLst>
       <p:ext uri="{BB962C8B-B14F-4D97-AF65-F5344CB8AC3E}">
-        <p14:creationId xmlns:p14="http://schemas.microsoft.com/office/powerpoint/2010/main" val="2209956329"/>
+        <p14:creationId xmlns:p14="http://schemas.microsoft.com/office/powerpoint/2010/main" xmlns="" val="2209956329"/>
       </p:ext>
     </p:extLst>
   </p:cSld>
@@ -1062,7 +1071,8 @@
           <a:p>
             <a:fld id="{2FFCD221-4BAF-B549-AD57-3A98595157F2}" type="datetimeFigureOut">
               <a:rPr lang="en-US" smtClean="0"/>
-              <a:t>10/17/2016</a:t>
+              <a:pPr/>
+              <a:t>10/31/2016</a:t>
             </a:fld>
             <a:endParaRPr lang="en-US"/>
           </a:p>
@@ -1104,6 +1114,7 @@
           <a:p>
             <a:fld id="{DB3E6F6E-1DEB-3C44-8B6B-0C5B62F4FAC7}" type="slidenum">
               <a:rPr lang="en-US" smtClean="0"/>
+              <a:pPr/>
               <a:t>‹#›</a:t>
             </a:fld>
             <a:endParaRPr lang="en-US"/>
@@ -1113,7 +1124,7 @@
     </p:spTree>
     <p:extLst>
       <p:ext uri="{BB962C8B-B14F-4D97-AF65-F5344CB8AC3E}">
-        <p14:creationId xmlns:p14="http://schemas.microsoft.com/office/powerpoint/2010/main" val="2998734526"/>
+        <p14:creationId xmlns:p14="http://schemas.microsoft.com/office/powerpoint/2010/main" xmlns="" val="2998734526"/>
       </p:ext>
     </p:extLst>
   </p:cSld>
@@ -1350,7 +1361,8 @@
           <a:p>
             <a:fld id="{2FFCD221-4BAF-B549-AD57-3A98595157F2}" type="datetimeFigureOut">
               <a:rPr lang="en-US" smtClean="0"/>
-              <a:t>10/17/2016</a:t>
+              <a:pPr/>
+              <a:t>10/31/2016</a:t>
             </a:fld>
             <a:endParaRPr lang="en-US"/>
           </a:p>
@@ -1392,6 +1404,7 @@
           <a:p>
             <a:fld id="{DB3E6F6E-1DEB-3C44-8B6B-0C5B62F4FAC7}" type="slidenum">
               <a:rPr lang="en-US" smtClean="0"/>
+              <a:pPr/>
               <a:t>‹#›</a:t>
             </a:fld>
             <a:endParaRPr lang="en-US"/>
@@ -1401,7 +1414,7 @@
     </p:spTree>
     <p:extLst>
       <p:ext uri="{BB962C8B-B14F-4D97-AF65-F5344CB8AC3E}">
-        <p14:creationId xmlns:p14="http://schemas.microsoft.com/office/powerpoint/2010/main" val="1545289543"/>
+        <p14:creationId xmlns:p14="http://schemas.microsoft.com/office/powerpoint/2010/main" xmlns="" val="1545289543"/>
       </p:ext>
     </p:extLst>
   </p:cSld>
@@ -1772,7 +1785,8 @@
           <a:p>
             <a:fld id="{2FFCD221-4BAF-B549-AD57-3A98595157F2}" type="datetimeFigureOut">
               <a:rPr lang="en-US" smtClean="0"/>
-              <a:t>10/17/2016</a:t>
+              <a:pPr/>
+              <a:t>10/31/2016</a:t>
             </a:fld>
             <a:endParaRPr lang="en-US"/>
           </a:p>
@@ -1814,6 +1828,7 @@
           <a:p>
             <a:fld id="{DB3E6F6E-1DEB-3C44-8B6B-0C5B62F4FAC7}" type="slidenum">
               <a:rPr lang="en-US" smtClean="0"/>
+              <a:pPr/>
               <a:t>‹#›</a:t>
             </a:fld>
             <a:endParaRPr lang="en-US"/>
@@ -1823,7 +1838,7 @@
     </p:spTree>
     <p:extLst>
       <p:ext uri="{BB962C8B-B14F-4D97-AF65-F5344CB8AC3E}">
-        <p14:creationId xmlns:p14="http://schemas.microsoft.com/office/powerpoint/2010/main" val="302065180"/>
+        <p14:creationId xmlns:p14="http://schemas.microsoft.com/office/powerpoint/2010/main" xmlns="" val="302065180"/>
       </p:ext>
     </p:extLst>
   </p:cSld>
@@ -1890,7 +1905,8 @@
           <a:p>
             <a:fld id="{2FFCD221-4BAF-B549-AD57-3A98595157F2}" type="datetimeFigureOut">
               <a:rPr lang="en-US" smtClean="0"/>
-              <a:t>10/17/2016</a:t>
+              <a:pPr/>
+              <a:t>10/31/2016</a:t>
             </a:fld>
             <a:endParaRPr lang="en-US"/>
           </a:p>
@@ -1932,6 +1948,7 @@
           <a:p>
             <a:fld id="{DB3E6F6E-1DEB-3C44-8B6B-0C5B62F4FAC7}" type="slidenum">
               <a:rPr lang="en-US" smtClean="0"/>
+              <a:pPr/>
               <a:t>‹#›</a:t>
             </a:fld>
             <a:endParaRPr lang="en-US"/>
@@ -1941,7 +1958,7 @@
     </p:spTree>
     <p:extLst>
       <p:ext uri="{BB962C8B-B14F-4D97-AF65-F5344CB8AC3E}">
-        <p14:creationId xmlns:p14="http://schemas.microsoft.com/office/powerpoint/2010/main" val="4043900700"/>
+        <p14:creationId xmlns:p14="http://schemas.microsoft.com/office/powerpoint/2010/main" xmlns="" val="4043900700"/>
       </p:ext>
     </p:extLst>
   </p:cSld>
@@ -1985,7 +2002,8 @@
           <a:p>
             <a:fld id="{2FFCD221-4BAF-B549-AD57-3A98595157F2}" type="datetimeFigureOut">
               <a:rPr lang="en-US" smtClean="0"/>
-              <a:t>10/17/2016</a:t>
+              <a:pPr/>
+              <a:t>10/31/2016</a:t>
             </a:fld>
             <a:endParaRPr lang="en-US"/>
           </a:p>
@@ -2027,6 +2045,7 @@
           <a:p>
             <a:fld id="{DB3E6F6E-1DEB-3C44-8B6B-0C5B62F4FAC7}" type="slidenum">
               <a:rPr lang="en-US" smtClean="0"/>
+              <a:pPr/>
               <a:t>‹#›</a:t>
             </a:fld>
             <a:endParaRPr lang="en-US"/>
@@ -2036,7 +2055,7 @@
     </p:spTree>
     <p:extLst>
       <p:ext uri="{BB962C8B-B14F-4D97-AF65-F5344CB8AC3E}">
-        <p14:creationId xmlns:p14="http://schemas.microsoft.com/office/powerpoint/2010/main" val="2151557169"/>
+        <p14:creationId xmlns:p14="http://schemas.microsoft.com/office/powerpoint/2010/main" xmlns="" val="2151557169"/>
       </p:ext>
     </p:extLst>
   </p:cSld>
@@ -2262,7 +2281,8 @@
           <a:p>
             <a:fld id="{2FFCD221-4BAF-B549-AD57-3A98595157F2}" type="datetimeFigureOut">
               <a:rPr lang="en-US" smtClean="0"/>
-              <a:t>10/17/2016</a:t>
+              <a:pPr/>
+              <a:t>10/31/2016</a:t>
             </a:fld>
             <a:endParaRPr lang="en-US"/>
           </a:p>
@@ -2304,6 +2324,7 @@
           <a:p>
             <a:fld id="{DB3E6F6E-1DEB-3C44-8B6B-0C5B62F4FAC7}" type="slidenum">
               <a:rPr lang="en-US" smtClean="0"/>
+              <a:pPr/>
               <a:t>‹#›</a:t>
             </a:fld>
             <a:endParaRPr lang="en-US"/>
@@ -2313,7 +2334,7 @@
     </p:spTree>
     <p:extLst>
       <p:ext uri="{BB962C8B-B14F-4D97-AF65-F5344CB8AC3E}">
-        <p14:creationId xmlns:p14="http://schemas.microsoft.com/office/powerpoint/2010/main" val="720569034"/>
+        <p14:creationId xmlns:p14="http://schemas.microsoft.com/office/powerpoint/2010/main" xmlns="" val="720569034"/>
       </p:ext>
     </p:extLst>
   </p:cSld>
@@ -2515,7 +2536,8 @@
           <a:p>
             <a:fld id="{2FFCD221-4BAF-B549-AD57-3A98595157F2}" type="datetimeFigureOut">
               <a:rPr lang="en-US" smtClean="0"/>
-              <a:t>10/17/2016</a:t>
+              <a:pPr/>
+              <a:t>10/31/2016</a:t>
             </a:fld>
             <a:endParaRPr lang="en-US"/>
           </a:p>
@@ -2557,6 +2579,7 @@
           <a:p>
             <a:fld id="{DB3E6F6E-1DEB-3C44-8B6B-0C5B62F4FAC7}" type="slidenum">
               <a:rPr lang="en-US" smtClean="0"/>
+              <a:pPr/>
               <a:t>‹#›</a:t>
             </a:fld>
             <a:endParaRPr lang="en-US"/>
@@ -2566,7 +2589,7 @@
     </p:spTree>
     <p:extLst>
       <p:ext uri="{BB962C8B-B14F-4D97-AF65-F5344CB8AC3E}">
-        <p14:creationId xmlns:p14="http://schemas.microsoft.com/office/powerpoint/2010/main" val="2191495314"/>
+        <p14:creationId xmlns:p14="http://schemas.microsoft.com/office/powerpoint/2010/main" xmlns="" val="2191495314"/>
       </p:ext>
     </p:extLst>
   </p:cSld>
@@ -2728,7 +2751,8 @@
           <a:p>
             <a:fld id="{2FFCD221-4BAF-B549-AD57-3A98595157F2}" type="datetimeFigureOut">
               <a:rPr lang="en-US" smtClean="0"/>
-              <a:t>10/17/2016</a:t>
+              <a:pPr/>
+              <a:t>10/31/2016</a:t>
             </a:fld>
             <a:endParaRPr lang="en-US"/>
           </a:p>
@@ -2806,6 +2830,7 @@
           <a:p>
             <a:fld id="{DB3E6F6E-1DEB-3C44-8B6B-0C5B62F4FAC7}" type="slidenum">
               <a:rPr lang="en-US" smtClean="0"/>
+              <a:pPr/>
               <a:t>‹#›</a:t>
             </a:fld>
             <a:endParaRPr lang="en-US"/>
@@ -2815,7 +2840,7 @@
     </p:spTree>
     <p:extLst>
       <p:ext uri="{BB962C8B-B14F-4D97-AF65-F5344CB8AC3E}">
-        <p14:creationId xmlns:p14="http://schemas.microsoft.com/office/powerpoint/2010/main" val="4249517459"/>
+        <p14:creationId xmlns:p14="http://schemas.microsoft.com/office/powerpoint/2010/main" xmlns="" val="4249517459"/>
       </p:ext>
     </p:extLst>
   </p:cSld>
@@ -3193,7 +3218,235 @@
     </p:spTree>
     <p:extLst>
       <p:ext uri="{BB962C8B-B14F-4D97-AF65-F5344CB8AC3E}">
-        <p14:creationId xmlns:p14="http://schemas.microsoft.com/office/powerpoint/2010/main" val="3206939814"/>
+        <p14:creationId xmlns:p14="http://schemas.microsoft.com/office/powerpoint/2010/main" xmlns="" val="3206939814"/>
+      </p:ext>
+    </p:extLst>
+  </p:cSld>
+  <p:clrMapOvr>
+    <a:masterClrMapping/>
+  </p:clrMapOvr>
+</p:sld>
+</file>
+
+<file path=ppt/slides/slide10.xml><?xml version="1.0" encoding="utf-8"?>
+<p:sld xmlns:a="http://schemas.openxmlformats.org/drawingml/2006/main" xmlns:r="http://schemas.openxmlformats.org/officeDocument/2006/relationships" xmlns:p="http://schemas.openxmlformats.org/presentationml/2006/main">
+  <p:cSld>
+    <p:spTree>
+      <p:nvGrpSpPr>
+        <p:cNvPr id="1" name=""/>
+        <p:cNvGrpSpPr/>
+        <p:nvPr/>
+      </p:nvGrpSpPr>
+      <p:grpSpPr>
+        <a:xfrm>
+          <a:off x="0" y="0"/>
+          <a:ext cx="0" cy="0"/>
+          <a:chOff x="0" y="0"/>
+          <a:chExt cx="0" cy="0"/>
+        </a:xfrm>
+      </p:grpSpPr>
+      <p:sp>
+        <p:nvSpPr>
+          <p:cNvPr id="2" name="Title 1"/>
+          <p:cNvSpPr>
+            <a:spLocks noGrp="1"/>
+          </p:cNvSpPr>
+          <p:nvPr>
+            <p:ph type="title"/>
+          </p:nvPr>
+        </p:nvSpPr>
+        <p:spPr>
+          <a:xfrm>
+            <a:off x="407581" y="-70921"/>
+            <a:ext cx="8229600" cy="1143000"/>
+          </a:xfrm>
+        </p:spPr>
+        <p:txBody>
+          <a:bodyPr/>
+          <a:lstStyle/>
+          <a:p>
+            <a:r>
+              <a:rPr lang="en-US" dirty="0" smtClean="0"/>
+              <a:t>Preliminary planned Workflow</a:t>
+            </a:r>
+            <a:endParaRPr lang="en-US" dirty="0"/>
+          </a:p>
+        </p:txBody>
+      </p:sp>
+      <p:sp>
+        <p:nvSpPr>
+          <p:cNvPr id="3" name="Content Placeholder 2"/>
+          <p:cNvSpPr>
+            <a:spLocks noGrp="1"/>
+          </p:cNvSpPr>
+          <p:nvPr>
+            <p:ph idx="1"/>
+          </p:nvPr>
+        </p:nvSpPr>
+        <p:spPr>
+          <a:xfrm>
+            <a:off x="407581" y="891364"/>
+            <a:ext cx="8229600" cy="4525963"/>
+          </a:xfrm>
+        </p:spPr>
+        <p:txBody>
+          <a:bodyPr>
+            <a:normAutofit fontScale="85000" lnSpcReduction="10000"/>
+          </a:bodyPr>
+          <a:lstStyle/>
+          <a:p>
+            <a:r>
+              <a:rPr lang="en-US" dirty="0" smtClean="0"/>
+              <a:t>Outlier detection</a:t>
+            </a:r>
+          </a:p>
+          <a:p>
+            <a:endParaRPr lang="en-US" dirty="0" smtClean="0"/>
+          </a:p>
+          <a:p>
+            <a:r>
+              <a:rPr lang="en-US" dirty="0" smtClean="0"/>
+              <a:t>Extraction of relevant </a:t>
+            </a:r>
+            <a:r>
+              <a:rPr lang="en-US" dirty="0" err="1" smtClean="0"/>
+              <a:t>voxel</a:t>
+            </a:r>
+            <a:r>
+              <a:rPr lang="en-US" dirty="0" smtClean="0"/>
+              <a:t> or VOI (volumes of interest)</a:t>
+            </a:r>
+          </a:p>
+          <a:p>
+            <a:endParaRPr lang="en-US" dirty="0" smtClean="0"/>
+          </a:p>
+          <a:p>
+            <a:r>
+              <a:rPr lang="en-US" dirty="0" smtClean="0"/>
+              <a:t>Statistical modeling of BOLD signals to task data (Brain response modeling)</a:t>
+            </a:r>
+          </a:p>
+          <a:p>
+            <a:pPr lvl="1"/>
+            <a:r>
+              <a:rPr lang="en-US" dirty="0" smtClean="0"/>
+              <a:t>Normalization of </a:t>
+            </a:r>
+            <a:r>
+              <a:rPr lang="en-US" dirty="0" err="1" smtClean="0"/>
+              <a:t>fMRI</a:t>
+            </a:r>
+            <a:r>
+              <a:rPr lang="en-US" dirty="0" smtClean="0"/>
+              <a:t> BOLD amplitude </a:t>
+            </a:r>
+          </a:p>
+          <a:p>
+            <a:pPr lvl="1"/>
+            <a:r>
+              <a:rPr lang="en-US" dirty="0" smtClean="0"/>
+              <a:t>Minimize the baseline difference across individuals</a:t>
+            </a:r>
+          </a:p>
+          <a:p>
+            <a:pPr lvl="1"/>
+            <a:r>
+              <a:rPr lang="en-US" dirty="0" smtClean="0"/>
+              <a:t>GLM  for individual </a:t>
+            </a:r>
+            <a:r>
+              <a:rPr lang="en-US" dirty="0" err="1" smtClean="0"/>
+              <a:t>vovel’s</a:t>
+            </a:r>
+            <a:r>
+              <a:rPr lang="en-US" dirty="0" smtClean="0"/>
+              <a:t> </a:t>
+            </a:r>
+            <a:r>
+              <a:rPr lang="en-US" dirty="0" err="1" smtClean="0"/>
+              <a:t>fMRI</a:t>
+            </a:r>
+            <a:r>
+              <a:rPr lang="en-US" dirty="0" smtClean="0"/>
+              <a:t> BOLD time series and the fitted parameters will be used to explain the functional activities of </a:t>
+            </a:r>
+            <a:r>
+              <a:rPr lang="en-US" dirty="0" err="1" smtClean="0"/>
+              <a:t>voxels</a:t>
+            </a:r>
+            <a:r>
+              <a:rPr lang="en-US" dirty="0" smtClean="0"/>
+              <a:t>.</a:t>
+            </a:r>
+          </a:p>
+          <a:p>
+            <a:pPr lvl="1"/>
+            <a:endParaRPr lang="en-US" dirty="0" smtClean="0"/>
+          </a:p>
+          <a:p>
+            <a:endParaRPr lang="en-US" dirty="0" smtClean="0"/>
+          </a:p>
+        </p:txBody>
+      </p:sp>
+      <p:pic>
+        <p:nvPicPr>
+          <p:cNvPr id="4" name="Picture 2" descr="http://ssp.dml.ir/wp-content/uploads/2013/07/braindecodingsample.jpg"/>
+          <p:cNvPicPr>
+            <a:picLocks noChangeAspect="1" noChangeArrowheads="1"/>
+          </p:cNvPicPr>
+          <p:nvPr/>
+        </p:nvPicPr>
+        <p:blipFill>
+          <a:blip r:embed="rId2"/>
+          <a:srcRect/>
+          <a:stretch>
+            <a:fillRect/>
+          </a:stretch>
+        </p:blipFill>
+        <p:spPr bwMode="auto">
+          <a:xfrm>
+            <a:off x="1903228" y="5417327"/>
+            <a:ext cx="4121888" cy="1189982"/>
+          </a:xfrm>
+          <a:prstGeom prst="rect">
+            <a:avLst/>
+          </a:prstGeom>
+          <a:noFill/>
+        </p:spPr>
+      </p:pic>
+      <p:sp>
+        <p:nvSpPr>
+          <p:cNvPr id="5" name="Rectangle 4"/>
+          <p:cNvSpPr/>
+          <p:nvPr/>
+        </p:nvSpPr>
+        <p:spPr>
+          <a:xfrm>
+            <a:off x="1984871" y="6607309"/>
+            <a:ext cx="5778347" cy="246221"/>
+          </a:xfrm>
+          <a:prstGeom prst="rect">
+            <a:avLst/>
+          </a:prstGeom>
+        </p:spPr>
+        <p:txBody>
+          <a:bodyPr wrap="square">
+            <a:spAutoFit/>
+          </a:bodyPr>
+          <a:lstStyle/>
+          <a:p>
+            <a:r>
+              <a:rPr lang="en-US" sz="1000" dirty="0" smtClean="0"/>
+              <a:t>http://ssp.dml.ir/wp-content/uploads/2013/07/braindecodingsample.jpg</a:t>
+            </a:r>
+            <a:endParaRPr lang="en-US" sz="1000" dirty="0"/>
+          </a:p>
+        </p:txBody>
+      </p:sp>
+    </p:spTree>
+    <p:extLst>
+      <p:ext uri="{BB962C8B-B14F-4D97-AF65-F5344CB8AC3E}">
+        <p14:creationId xmlns:p14="http://schemas.microsoft.com/office/powerpoint/2010/main" xmlns="" val="1255414466"/>
       </p:ext>
     </p:extLst>
   </p:cSld>
@@ -3289,7 +3542,7 @@
     </p:spTree>
     <p:extLst>
       <p:ext uri="{BB962C8B-B14F-4D97-AF65-F5344CB8AC3E}">
-        <p14:creationId xmlns:p14="http://schemas.microsoft.com/office/powerpoint/2010/main" val="356378589"/>
+        <p14:creationId xmlns:p14="http://schemas.microsoft.com/office/powerpoint/2010/main" xmlns="" val="356378589"/>
       </p:ext>
     </p:extLst>
   </p:cSld>
@@ -3386,7 +3639,7 @@
           <a:blip r:embed="rId2">
             <a:extLst>
               <a:ext uri="{28A0092B-C50C-407E-A947-70E740481C1C}">
-                <a14:useLocalDpi xmlns:a14="http://schemas.microsoft.com/office/drawing/2010/main" val="0"/>
+                <a14:useLocalDpi xmlns:a14="http://schemas.microsoft.com/office/drawing/2010/main" xmlns="" val="0"/>
               </a:ext>
             </a:extLst>
           </a:blip>
@@ -3407,7 +3660,7 @@
     </p:spTree>
     <p:extLst>
       <p:ext uri="{BB962C8B-B14F-4D97-AF65-F5344CB8AC3E}">
-        <p14:creationId xmlns:p14="http://schemas.microsoft.com/office/powerpoint/2010/main" val="4115223507"/>
+        <p14:creationId xmlns:p14="http://schemas.microsoft.com/office/powerpoint/2010/main" xmlns="" val="4115223507"/>
       </p:ext>
     </p:extLst>
   </p:cSld>
@@ -3507,7 +3760,7 @@
           <a:blip r:embed="rId2">
             <a:extLst>
               <a:ext uri="{28A0092B-C50C-407E-A947-70E740481C1C}">
-                <a14:useLocalDpi xmlns:a14="http://schemas.microsoft.com/office/drawing/2010/main" val="0"/>
+                <a14:useLocalDpi xmlns:a14="http://schemas.microsoft.com/office/drawing/2010/main" xmlns="" val="0"/>
               </a:ext>
             </a:extLst>
           </a:blip>
@@ -3527,7 +3780,7 @@
     </p:spTree>
     <p:extLst>
       <p:ext uri="{BB962C8B-B14F-4D97-AF65-F5344CB8AC3E}">
-        <p14:creationId xmlns:p14="http://schemas.microsoft.com/office/powerpoint/2010/main" val="2559374199"/>
+        <p14:creationId xmlns:p14="http://schemas.microsoft.com/office/powerpoint/2010/main" xmlns="" val="2559374199"/>
       </p:ext>
     </p:extLst>
   </p:cSld>
@@ -3586,7 +3839,7 @@
           <p:nvPr>
             <p:extLst>
               <p:ext uri="{D42A27DB-BD31-4B8C-83A1-F6EECF244321}">
-                <p14:modId xmlns:p14="http://schemas.microsoft.com/office/powerpoint/2010/main" val="3154774735"/>
+                <p14:modId xmlns:p14="http://schemas.microsoft.com/office/powerpoint/2010/main" xmlns="" val="3154774735"/>
               </p:ext>
             </p:extLst>
           </p:nvPr>
@@ -3940,7 +4193,7 @@
     </p:spTree>
     <p:extLst>
       <p:ext uri="{BB962C8B-B14F-4D97-AF65-F5344CB8AC3E}">
-        <p14:creationId xmlns:p14="http://schemas.microsoft.com/office/powerpoint/2010/main" val="3692776483"/>
+        <p14:creationId xmlns:p14="http://schemas.microsoft.com/office/powerpoint/2010/main" xmlns="" val="3692776483"/>
       </p:ext>
     </p:extLst>
   </p:cSld>
@@ -4058,7 +4311,7 @@
     </p:spTree>
     <p:extLst>
       <p:ext uri="{BB962C8B-B14F-4D97-AF65-F5344CB8AC3E}">
-        <p14:creationId xmlns:p14="http://schemas.microsoft.com/office/powerpoint/2010/main" val="1981491652"/>
+        <p14:creationId xmlns:p14="http://schemas.microsoft.com/office/powerpoint/2010/main" xmlns="" val="1981491652"/>
       </p:ext>
     </p:extLst>
   </p:cSld>
@@ -4158,7 +4411,7 @@
     </p:spTree>
     <p:extLst>
       <p:ext uri="{BB962C8B-B14F-4D97-AF65-F5344CB8AC3E}">
-        <p14:creationId xmlns:p14="http://schemas.microsoft.com/office/powerpoint/2010/main" val="4066989049"/>
+        <p14:creationId xmlns:p14="http://schemas.microsoft.com/office/powerpoint/2010/main" xmlns="" val="4066989049"/>
       </p:ext>
     </p:extLst>
   </p:cSld>
@@ -4187,30 +4440,38 @@
       </p:grpSpPr>
       <p:sp>
         <p:nvSpPr>
-          <p:cNvPr id="2" name="Title 1"/>
-          <p:cNvSpPr>
-            <a:spLocks noGrp="1"/>
-          </p:cNvSpPr>
-          <p:nvPr>
-            <p:ph type="title"/>
-          </p:nvPr>
-        </p:nvSpPr>
-        <p:spPr/>
-        <p:txBody>
-          <a:bodyPr/>
-          <a:lstStyle/>
-          <a:p>
-            <a:r>
-              <a:rPr lang="en-US" dirty="0" smtClean="0"/>
-              <a:t>Analyses</a:t>
-            </a:r>
-            <a:endParaRPr lang="en-US" dirty="0"/>
-          </a:p>
-        </p:txBody>
-      </p:sp>
-      <p:sp>
-        <p:nvSpPr>
-          <p:cNvPr id="3" name="Content Placeholder 2"/>
+          <p:cNvPr id="5" name="Rectangle 4"/>
+          <p:cNvSpPr/>
+          <p:nvPr/>
+        </p:nvSpPr>
+        <p:spPr>
+          <a:xfrm>
+            <a:off x="306055173" y="3382834"/>
+            <a:ext cx="0" cy="92333"/>
+          </a:xfrm>
+          <a:prstGeom prst="rect">
+            <a:avLst/>
+          </a:prstGeom>
+        </p:spPr>
+        <p:txBody>
+          <a:bodyPr wrap="none">
+            <a:spAutoFit/>
+          </a:bodyPr>
+          <a:lstStyle/>
+          <a:p>
+            <a:r>
+              <a:rPr lang="en-US" sz="2800" dirty="0" smtClean="0"/>
+              <a:t>Preprocessing +Steps +</a:t>
+            </a:r>
+            <a:endParaRPr lang="en-US" sz="2800" dirty="0"/>
+          </a:p>
+        </p:txBody>
+      </p:sp>
+      <p:sp>
+        <p:nvSpPr>
+          <p:cNvPr id="6" name="Content Placeholder 5"/>
           <p:cNvSpPr>
             <a:spLocks noGrp="1"/>
           </p:cNvSpPr>
@@ -4224,37 +4485,76 @@
           <a:lstStyle/>
           <a:p>
             <a:r>
-              <a:rPr lang="en-US" dirty="0" smtClean="0"/>
-              <a:t>Replicate control results from Stephan-Otto et al. (2016)</a:t>
-            </a:r>
-          </a:p>
-          <a:p>
-            <a:r>
-              <a:rPr lang="en-US" dirty="0" smtClean="0"/>
-              <a:t>Contrast Hits and False Alarms</a:t>
-            </a:r>
-          </a:p>
-          <a:p>
-            <a:r>
-              <a:rPr lang="en-US" dirty="0" smtClean="0"/>
-              <a:t>Contrast Correct Rejections and Omissions</a:t>
-            </a:r>
-          </a:p>
-          <a:p>
-            <a:r>
-              <a:rPr lang="en-US" dirty="0" smtClean="0"/>
-              <a:t>Correlate with Visual Imagery, Hallucination, and Delusion scores</a:t>
-            </a:r>
-            <a:endParaRPr lang="en-US" dirty="0"/>
+              <a:rPr lang="en-US" sz="2800" dirty="0" smtClean="0"/>
+              <a:t>Motion correction</a:t>
+            </a:r>
+          </a:p>
+          <a:p>
+            <a:r>
+              <a:rPr lang="en-US" sz="2800" dirty="0" smtClean="0"/>
+              <a:t>Outlier detection</a:t>
+            </a:r>
+          </a:p>
+          <a:p>
+            <a:r>
+              <a:rPr lang="en-US" sz="2800" dirty="0" smtClean="0"/>
+              <a:t>Slice-timing correction</a:t>
+            </a:r>
+          </a:p>
+          <a:p>
+            <a:r>
+              <a:rPr lang="en-US" sz="2800" dirty="0" smtClean="0"/>
+              <a:t>Spatial filtering</a:t>
+            </a:r>
+          </a:p>
+          <a:p>
+            <a:r>
+              <a:rPr lang="en-US" sz="2800" dirty="0" smtClean="0"/>
+              <a:t>Temporal filtering</a:t>
+            </a:r>
+          </a:p>
+          <a:p>
+            <a:r>
+              <a:rPr lang="en-US" sz="2800" dirty="0" smtClean="0"/>
+              <a:t>Global intensity normalization</a:t>
+            </a:r>
+          </a:p>
+          <a:p>
+            <a:endParaRPr lang="en-US" sz="2800" dirty="0"/>
+          </a:p>
+        </p:txBody>
+      </p:sp>
+      <p:sp>
+        <p:nvSpPr>
+          <p:cNvPr id="7" name="TextBox 6"/>
+          <p:cNvSpPr txBox="1"/>
+          <p:nvPr/>
+        </p:nvSpPr>
+        <p:spPr>
+          <a:xfrm>
+            <a:off x="2459666" y="708837"/>
+            <a:ext cx="3877728" cy="646331"/>
+          </a:xfrm>
+          <a:prstGeom prst="rect">
+            <a:avLst/>
+          </a:prstGeom>
+          <a:noFill/>
+        </p:spPr>
+        <p:txBody>
+          <a:bodyPr wrap="none" rtlCol="0">
+            <a:spAutoFit/>
+          </a:bodyPr>
+          <a:lstStyle/>
+          <a:p>
+            <a:r>
+              <a:rPr lang="en-US" sz="3600" dirty="0" smtClean="0"/>
+              <a:t>Preprocessing steps</a:t>
+            </a:r>
+            <a:endParaRPr lang="en-US" sz="3600" dirty="0"/>
           </a:p>
         </p:txBody>
       </p:sp>
     </p:spTree>
-    <p:extLst>
-      <p:ext uri="{BB962C8B-B14F-4D97-AF65-F5344CB8AC3E}">
-        <p14:creationId xmlns:p14="http://schemas.microsoft.com/office/powerpoint/2010/main" val="508429857"/>
-      </p:ext>
-    </p:extLst>
   </p:cSld>
   <p:clrMapOvr>
     <a:masterClrMapping/>
@@ -4289,19 +4589,14 @@
             <p:ph type="title"/>
           </p:nvPr>
         </p:nvSpPr>
-        <p:spPr>
-          <a:xfrm>
-            <a:off x="407581" y="-70921"/>
-            <a:ext cx="8229600" cy="1143000"/>
-          </a:xfrm>
-        </p:spPr>
+        <p:spPr/>
         <p:txBody>
           <a:bodyPr/>
           <a:lstStyle/>
           <a:p>
             <a:r>
               <a:rPr lang="en-US" dirty="0" smtClean="0"/>
-              <a:t>Preliminary planned Workflow</a:t>
+              <a:t>Analyses</a:t>
             </a:r>
             <a:endParaRPr lang="en-US" dirty="0"/>
           </a:p>
@@ -4317,170 +4612,41 @@
             <p:ph idx="1"/>
           </p:nvPr>
         </p:nvSpPr>
-        <p:spPr>
-          <a:xfrm>
-            <a:off x="407581" y="891364"/>
-            <a:ext cx="8229600" cy="4525963"/>
-          </a:xfrm>
-        </p:spPr>
-        <p:txBody>
-          <a:bodyPr>
-            <a:normAutofit fontScale="85000" lnSpcReduction="10000"/>
-          </a:bodyPr>
+        <p:spPr/>
+        <p:txBody>
+          <a:bodyPr/>
           <a:lstStyle/>
           <a:p>
             <a:r>
               <a:rPr lang="en-US" dirty="0" smtClean="0"/>
-              <a:t>Outlier detection</a:t>
-            </a:r>
-          </a:p>
-          <a:p>
-            <a:endParaRPr lang="en-US" dirty="0" smtClean="0"/>
+              <a:t>Replicate control results from Stephan-Otto et al. (2016)</a:t>
+            </a:r>
           </a:p>
           <a:p>
             <a:r>
               <a:rPr lang="en-US" dirty="0" smtClean="0"/>
-              <a:t>Extraction of relevant </a:t>
-            </a:r>
-            <a:r>
-              <a:rPr lang="en-US" dirty="0" err="1" smtClean="0"/>
-              <a:t>voxel</a:t>
-            </a:r>
+              <a:t>Contrast Hits and False Alarms</a:t>
+            </a:r>
+          </a:p>
+          <a:p>
             <a:r>
               <a:rPr lang="en-US" dirty="0" smtClean="0"/>
-              <a:t> or VOI (volumes of interest)</a:t>
-            </a:r>
-          </a:p>
-          <a:p>
-            <a:endParaRPr lang="en-US" dirty="0" smtClean="0"/>
+              <a:t>Contrast Correct Rejections and Omissions</a:t>
+            </a:r>
           </a:p>
           <a:p>
             <a:r>
               <a:rPr lang="en-US" dirty="0" smtClean="0"/>
-              <a:t>Statistical modeling of BOLD signals to task data (Brain response modeling)</a:t>
-            </a:r>
-          </a:p>
-          <a:p>
-            <a:pPr lvl="1"/>
-            <a:r>
-              <a:rPr lang="en-US" dirty="0" smtClean="0"/>
-              <a:t>Normalization of </a:t>
-            </a:r>
-            <a:r>
-              <a:rPr lang="en-US" dirty="0" err="1" smtClean="0"/>
-              <a:t>fMRI</a:t>
-            </a:r>
-            <a:r>
-              <a:rPr lang="en-US" dirty="0" smtClean="0"/>
-              <a:t> BOLD amplitude </a:t>
-            </a:r>
-          </a:p>
-          <a:p>
-            <a:pPr lvl="1"/>
-            <a:r>
-              <a:rPr lang="en-US" dirty="0" smtClean="0"/>
-              <a:t>Minimize the baseline difference across individuals</a:t>
-            </a:r>
-          </a:p>
-          <a:p>
-            <a:pPr lvl="1"/>
-            <a:r>
-              <a:rPr lang="en-US" dirty="0" smtClean="0"/>
-              <a:t>GLM  for individual </a:t>
-            </a:r>
-            <a:r>
-              <a:rPr lang="en-US" dirty="0" err="1" smtClean="0"/>
-              <a:t>vovel’s</a:t>
-            </a:r>
-            <a:r>
-              <a:rPr lang="en-US" dirty="0" smtClean="0"/>
-              <a:t> </a:t>
-            </a:r>
-            <a:r>
-              <a:rPr lang="en-US" dirty="0" err="1" smtClean="0"/>
-              <a:t>fMRI</a:t>
-            </a:r>
-            <a:r>
-              <a:rPr lang="en-US" dirty="0" smtClean="0"/>
-              <a:t> BOLD time series and the fitted parameters will be used to explain the functional activities of </a:t>
-            </a:r>
-            <a:r>
-              <a:rPr lang="en-US" dirty="0" err="1" smtClean="0"/>
-              <a:t>voxels</a:t>
-            </a:r>
-            <a:r>
-              <a:rPr lang="en-US" dirty="0" smtClean="0"/>
-              <a:t>.</a:t>
-            </a:r>
-          </a:p>
-          <a:p>
-            <a:pPr lvl="1"/>
-            <a:endParaRPr lang="en-US" dirty="0" smtClean="0"/>
-          </a:p>
-          <a:p>
-            <a:endParaRPr lang="en-US" dirty="0" smtClean="0"/>
-          </a:p>
-        </p:txBody>
-      </p:sp>
-      <p:pic>
-        <p:nvPicPr>
-          <p:cNvPr id="4" name="Picture 2" descr="http://ssp.dml.ir/wp-content/uploads/2013/07/braindecodingsample.jpg"/>
-          <p:cNvPicPr>
-            <a:picLocks noChangeAspect="1" noChangeArrowheads="1"/>
-          </p:cNvPicPr>
-          <p:nvPr/>
-        </p:nvPicPr>
-        <p:blipFill>
-          <a:blip r:embed="rId2"/>
-          <a:srcRect/>
-          <a:stretch>
-            <a:fillRect/>
-          </a:stretch>
-        </p:blipFill>
-        <p:spPr bwMode="auto">
-          <a:xfrm>
-            <a:off x="1903228" y="5417327"/>
-            <a:ext cx="4121888" cy="1189982"/>
-          </a:xfrm>
-          <a:prstGeom prst="rect">
-            <a:avLst/>
-          </a:prstGeom>
-          <a:noFill/>
-        </p:spPr>
-      </p:pic>
-      <p:sp>
-        <p:nvSpPr>
-          <p:cNvPr id="5" name="Rectangle 4"/>
-          <p:cNvSpPr/>
-          <p:nvPr/>
-        </p:nvSpPr>
-        <p:spPr>
-          <a:xfrm>
-            <a:off x="1984871" y="6607309"/>
-            <a:ext cx="5778347" cy="246221"/>
-          </a:xfrm>
-          <a:prstGeom prst="rect">
-            <a:avLst/>
-          </a:prstGeom>
-        </p:spPr>
-        <p:txBody>
-          <a:bodyPr wrap="square">
-            <a:spAutoFit/>
-          </a:bodyPr>
-          <a:lstStyle/>
-          <a:p>
-            <a:r>
-              <a:rPr lang="en-US" sz="1000" dirty="0" smtClean="0"/>
-              <a:t>http://ssp.dml.ir/wp-content/uploads/2013/07/braindecodingsample.jpg</a:t>
-            </a:r>
-            <a:endParaRPr lang="en-US" sz="1000" dirty="0"/>
+              <a:t>Correlate with Visual Imagery, Hallucination, and Delusion scores</a:t>
+            </a:r>
+            <a:endParaRPr lang="en-US" dirty="0"/>
           </a:p>
         </p:txBody>
       </p:sp>
     </p:spTree>
     <p:extLst>
       <p:ext uri="{BB962C8B-B14F-4D97-AF65-F5344CB8AC3E}">
-        <p14:creationId xmlns:p14="http://schemas.microsoft.com/office/powerpoint/2010/main" val="1255414466"/>
+        <p14:creationId xmlns:p14="http://schemas.microsoft.com/office/powerpoint/2010/main" xmlns="" val="508429857"/>
       </p:ext>
     </p:extLst>
   </p:cSld>

</xml_diff>

<commit_message>
Updated powerpoint with current goals and steps.
</commit_message>
<xml_diff>
--- a/project-blue.pptx
+++ b/project-blue.pptx
@@ -4,6 +4,9 @@
   <p:sldMasterIdLst>
     <p:sldMasterId id="2147483648" r:id="rId1"/>
   </p:sldMasterIdLst>
+  <p:notesMasterIdLst>
+    <p:notesMasterId r:id="rId16"/>
+  </p:notesMasterIdLst>
   <p:sldIdLst>
     <p:sldId id="256" r:id="rId2"/>
     <p:sldId id="259" r:id="rId3"/>
@@ -12,9 +15,13 @@
     <p:sldId id="265" r:id="rId6"/>
     <p:sldId id="261" r:id="rId7"/>
     <p:sldId id="262" r:id="rId8"/>
-    <p:sldId id="266" r:id="rId9"/>
-    <p:sldId id="263" r:id="rId10"/>
-    <p:sldId id="264" r:id="rId11"/>
+    <p:sldId id="263" r:id="rId9"/>
+    <p:sldId id="270" r:id="rId10"/>
+    <p:sldId id="272" r:id="rId11"/>
+    <p:sldId id="271" r:id="rId12"/>
+    <p:sldId id="273" r:id="rId13"/>
+    <p:sldId id="274" r:id="rId14"/>
+    <p:sldId id="275" r:id="rId15"/>
   </p:sldIdLst>
   <p:sldSz cx="9144000" cy="6858000" type="screen4x3"/>
   <p:notesSz cx="6858000" cy="9144000"/>
@@ -113,7 +120,549 @@
       </a:defRPr>
     </a:lvl9pPr>
   </p:defaultTextStyle>
+  <p:extLst>
+    <p:ext uri="{EFAFB233-063F-42B5-8137-9DF3F51BA10A}">
+      <p15:sldGuideLst xmlns:p15="http://schemas.microsoft.com/office/powerpoint/2012/main">
+        <p15:guide id="1" orient="horz" pos="2160">
+          <p15:clr>
+            <a:srgbClr val="A4A3A4"/>
+          </p15:clr>
+        </p15:guide>
+        <p15:guide id="2" pos="2880">
+          <p15:clr>
+            <a:srgbClr val="A4A3A4"/>
+          </p15:clr>
+        </p15:guide>
+      </p15:sldGuideLst>
+    </p:ext>
+  </p:extLst>
 </p:presentation>
+</file>
+
+<file path=ppt/notesMasters/notesMaster1.xml><?xml version="1.0" encoding="utf-8"?>
+<p:notesMaster xmlns:a="http://schemas.openxmlformats.org/drawingml/2006/main" xmlns:r="http://schemas.openxmlformats.org/officeDocument/2006/relationships" xmlns:p="http://schemas.openxmlformats.org/presentationml/2006/main">
+  <p:cSld>
+    <p:bg>
+      <p:bgRef idx="1001">
+        <a:schemeClr val="bg1"/>
+      </p:bgRef>
+    </p:bg>
+    <p:spTree>
+      <p:nvGrpSpPr>
+        <p:cNvPr id="1" name=""/>
+        <p:cNvGrpSpPr/>
+        <p:nvPr/>
+      </p:nvGrpSpPr>
+      <p:grpSpPr>
+        <a:xfrm>
+          <a:off x="0" y="0"/>
+          <a:ext cx="0" cy="0"/>
+          <a:chOff x="0" y="0"/>
+          <a:chExt cx="0" cy="0"/>
+        </a:xfrm>
+      </p:grpSpPr>
+      <p:sp>
+        <p:nvSpPr>
+          <p:cNvPr id="2" name="Header Placeholder 1"/>
+          <p:cNvSpPr>
+            <a:spLocks noGrp="1"/>
+          </p:cNvSpPr>
+          <p:nvPr>
+            <p:ph type="hdr" sz="quarter"/>
+          </p:nvPr>
+        </p:nvSpPr>
+        <p:spPr>
+          <a:xfrm>
+            <a:off x="0" y="0"/>
+            <a:ext cx="2971800" cy="458788"/>
+          </a:xfrm>
+          <a:prstGeom prst="rect">
+            <a:avLst/>
+          </a:prstGeom>
+        </p:spPr>
+        <p:txBody>
+          <a:bodyPr vert="horz" lIns="91440" tIns="45720" rIns="91440" bIns="45720" rtlCol="0"/>
+          <a:lstStyle>
+            <a:lvl1pPr algn="l">
+              <a:defRPr sz="1200"/>
+            </a:lvl1pPr>
+          </a:lstStyle>
+          <a:p>
+            <a:endParaRPr lang="en-US"/>
+          </a:p>
+        </p:txBody>
+      </p:sp>
+      <p:sp>
+        <p:nvSpPr>
+          <p:cNvPr id="3" name="Date Placeholder 2"/>
+          <p:cNvSpPr>
+            <a:spLocks noGrp="1"/>
+          </p:cNvSpPr>
+          <p:nvPr>
+            <p:ph type="dt" idx="1"/>
+          </p:nvPr>
+        </p:nvSpPr>
+        <p:spPr>
+          <a:xfrm>
+            <a:off x="3884613" y="0"/>
+            <a:ext cx="2971800" cy="458788"/>
+          </a:xfrm>
+          <a:prstGeom prst="rect">
+            <a:avLst/>
+          </a:prstGeom>
+        </p:spPr>
+        <p:txBody>
+          <a:bodyPr vert="horz" lIns="91440" tIns="45720" rIns="91440" bIns="45720" rtlCol="0"/>
+          <a:lstStyle>
+            <a:lvl1pPr algn="r">
+              <a:defRPr sz="1200"/>
+            </a:lvl1pPr>
+          </a:lstStyle>
+          <a:p>
+            <a:fld id="{E638FC40-58E7-4D42-A11B-1DF1D10B0D0C}" type="datetimeFigureOut">
+              <a:rPr lang="en-US" smtClean="0"/>
+              <a:t>11/15/16</a:t>
+            </a:fld>
+            <a:endParaRPr lang="en-US"/>
+          </a:p>
+        </p:txBody>
+      </p:sp>
+      <p:sp>
+        <p:nvSpPr>
+          <p:cNvPr id="4" name="Slide Image Placeholder 3"/>
+          <p:cNvSpPr>
+            <a:spLocks noGrp="1" noRot="1" noChangeAspect="1"/>
+          </p:cNvSpPr>
+          <p:nvPr>
+            <p:ph type="sldImg" idx="2"/>
+          </p:nvPr>
+        </p:nvSpPr>
+        <p:spPr>
+          <a:xfrm>
+            <a:off x="1371600" y="1143000"/>
+            <a:ext cx="4114800" cy="3086100"/>
+          </a:xfrm>
+          <a:prstGeom prst="rect">
+            <a:avLst/>
+          </a:prstGeom>
+          <a:noFill/>
+          <a:ln w="12700">
+            <a:solidFill>
+              <a:prstClr val="black"/>
+            </a:solidFill>
+          </a:ln>
+        </p:spPr>
+        <p:txBody>
+          <a:bodyPr vert="horz" lIns="91440" tIns="45720" rIns="91440" bIns="45720" rtlCol="0" anchor="ctr"/>
+          <a:lstStyle/>
+          <a:p>
+            <a:endParaRPr lang="en-US"/>
+          </a:p>
+        </p:txBody>
+      </p:sp>
+      <p:sp>
+        <p:nvSpPr>
+          <p:cNvPr id="5" name="Notes Placeholder 4"/>
+          <p:cNvSpPr>
+            <a:spLocks noGrp="1"/>
+          </p:cNvSpPr>
+          <p:nvPr>
+            <p:ph type="body" sz="quarter" idx="3"/>
+          </p:nvPr>
+        </p:nvSpPr>
+        <p:spPr>
+          <a:xfrm>
+            <a:off x="685800" y="4400550"/>
+            <a:ext cx="5486400" cy="3600450"/>
+          </a:xfrm>
+          <a:prstGeom prst="rect">
+            <a:avLst/>
+          </a:prstGeom>
+        </p:spPr>
+        <p:txBody>
+          <a:bodyPr vert="horz" lIns="91440" tIns="45720" rIns="91440" bIns="45720" rtlCol="0"/>
+          <a:lstStyle/>
+          <a:p>
+            <a:pPr lvl="0"/>
+            <a:r>
+              <a:rPr lang="en-US" smtClean="0"/>
+              <a:t>Click to edit Master text styles</a:t>
+            </a:r>
+          </a:p>
+          <a:p>
+            <a:pPr lvl="1"/>
+            <a:r>
+              <a:rPr lang="en-US" smtClean="0"/>
+              <a:t>Second level</a:t>
+            </a:r>
+          </a:p>
+          <a:p>
+            <a:pPr lvl="2"/>
+            <a:r>
+              <a:rPr lang="en-US" smtClean="0"/>
+              <a:t>Third level</a:t>
+            </a:r>
+          </a:p>
+          <a:p>
+            <a:pPr lvl="3"/>
+            <a:r>
+              <a:rPr lang="en-US" smtClean="0"/>
+              <a:t>Fourth level</a:t>
+            </a:r>
+          </a:p>
+          <a:p>
+            <a:pPr lvl="4"/>
+            <a:r>
+              <a:rPr lang="en-US" smtClean="0"/>
+              <a:t>Fifth level</a:t>
+            </a:r>
+            <a:endParaRPr lang="en-US"/>
+          </a:p>
+        </p:txBody>
+      </p:sp>
+      <p:sp>
+        <p:nvSpPr>
+          <p:cNvPr id="6" name="Footer Placeholder 5"/>
+          <p:cNvSpPr>
+            <a:spLocks noGrp="1"/>
+          </p:cNvSpPr>
+          <p:nvPr>
+            <p:ph type="ftr" sz="quarter" idx="4"/>
+          </p:nvPr>
+        </p:nvSpPr>
+        <p:spPr>
+          <a:xfrm>
+            <a:off x="0" y="8685213"/>
+            <a:ext cx="2971800" cy="458787"/>
+          </a:xfrm>
+          <a:prstGeom prst="rect">
+            <a:avLst/>
+          </a:prstGeom>
+        </p:spPr>
+        <p:txBody>
+          <a:bodyPr vert="horz" lIns="91440" tIns="45720" rIns="91440" bIns="45720" rtlCol="0" anchor="b"/>
+          <a:lstStyle>
+            <a:lvl1pPr algn="l">
+              <a:defRPr sz="1200"/>
+            </a:lvl1pPr>
+          </a:lstStyle>
+          <a:p>
+            <a:endParaRPr lang="en-US"/>
+          </a:p>
+        </p:txBody>
+      </p:sp>
+      <p:sp>
+        <p:nvSpPr>
+          <p:cNvPr id="7" name="Slide Number Placeholder 6"/>
+          <p:cNvSpPr>
+            <a:spLocks noGrp="1"/>
+          </p:cNvSpPr>
+          <p:nvPr>
+            <p:ph type="sldNum" sz="quarter" idx="5"/>
+          </p:nvPr>
+        </p:nvSpPr>
+        <p:spPr>
+          <a:xfrm>
+            <a:off x="3884613" y="8685213"/>
+            <a:ext cx="2971800" cy="458787"/>
+          </a:xfrm>
+          <a:prstGeom prst="rect">
+            <a:avLst/>
+          </a:prstGeom>
+        </p:spPr>
+        <p:txBody>
+          <a:bodyPr vert="horz" lIns="91440" tIns="45720" rIns="91440" bIns="45720" rtlCol="0" anchor="b"/>
+          <a:lstStyle>
+            <a:lvl1pPr algn="r">
+              <a:defRPr sz="1200"/>
+            </a:lvl1pPr>
+          </a:lstStyle>
+          <a:p>
+            <a:fld id="{87E6E711-D72A-E943-B62C-1DB873B9CC75}" type="slidenum">
+              <a:rPr lang="en-US" smtClean="0"/>
+              <a:t>‹#›</a:t>
+            </a:fld>
+            <a:endParaRPr lang="en-US"/>
+          </a:p>
+        </p:txBody>
+      </p:sp>
+    </p:spTree>
+    <p:extLst>
+      <p:ext uri="{BB962C8B-B14F-4D97-AF65-F5344CB8AC3E}">
+        <p14:creationId xmlns:p14="http://schemas.microsoft.com/office/powerpoint/2010/main" val="1671644827"/>
+      </p:ext>
+    </p:extLst>
+  </p:cSld>
+  <p:clrMap bg1="lt1" tx1="dk1" bg2="lt2" tx2="dk2" accent1="accent1" accent2="accent2" accent3="accent3" accent4="accent4" accent5="accent5" accent6="accent6" hlink="hlink" folHlink="folHlink"/>
+  <p:notesStyle>
+    <a:lvl1pPr marL="0" algn="l" defTabSz="914400" rtl="0" eaLnBrk="1" latinLnBrk="0" hangingPunct="1">
+      <a:defRPr sz="1200" kern="1200">
+        <a:solidFill>
+          <a:schemeClr val="tx1"/>
+        </a:solidFill>
+        <a:latin typeface="+mn-lt"/>
+        <a:ea typeface="+mn-ea"/>
+        <a:cs typeface="+mn-cs"/>
+      </a:defRPr>
+    </a:lvl1pPr>
+    <a:lvl2pPr marL="457200" algn="l" defTabSz="914400" rtl="0" eaLnBrk="1" latinLnBrk="0" hangingPunct="1">
+      <a:defRPr sz="1200" kern="1200">
+        <a:solidFill>
+          <a:schemeClr val="tx1"/>
+        </a:solidFill>
+        <a:latin typeface="+mn-lt"/>
+        <a:ea typeface="+mn-ea"/>
+        <a:cs typeface="+mn-cs"/>
+      </a:defRPr>
+    </a:lvl2pPr>
+    <a:lvl3pPr marL="914400" algn="l" defTabSz="914400" rtl="0" eaLnBrk="1" latinLnBrk="0" hangingPunct="1">
+      <a:defRPr sz="1200" kern="1200">
+        <a:solidFill>
+          <a:schemeClr val="tx1"/>
+        </a:solidFill>
+        <a:latin typeface="+mn-lt"/>
+        <a:ea typeface="+mn-ea"/>
+        <a:cs typeface="+mn-cs"/>
+      </a:defRPr>
+    </a:lvl3pPr>
+    <a:lvl4pPr marL="1371600" algn="l" defTabSz="914400" rtl="0" eaLnBrk="1" latinLnBrk="0" hangingPunct="1">
+      <a:defRPr sz="1200" kern="1200">
+        <a:solidFill>
+          <a:schemeClr val="tx1"/>
+        </a:solidFill>
+        <a:latin typeface="+mn-lt"/>
+        <a:ea typeface="+mn-ea"/>
+        <a:cs typeface="+mn-cs"/>
+      </a:defRPr>
+    </a:lvl4pPr>
+    <a:lvl5pPr marL="1828800" algn="l" defTabSz="914400" rtl="0" eaLnBrk="1" latinLnBrk="0" hangingPunct="1">
+      <a:defRPr sz="1200" kern="1200">
+        <a:solidFill>
+          <a:schemeClr val="tx1"/>
+        </a:solidFill>
+        <a:latin typeface="+mn-lt"/>
+        <a:ea typeface="+mn-ea"/>
+        <a:cs typeface="+mn-cs"/>
+      </a:defRPr>
+    </a:lvl5pPr>
+    <a:lvl6pPr marL="2286000" algn="l" defTabSz="914400" rtl="0" eaLnBrk="1" latinLnBrk="0" hangingPunct="1">
+      <a:defRPr sz="1200" kern="1200">
+        <a:solidFill>
+          <a:schemeClr val="tx1"/>
+        </a:solidFill>
+        <a:latin typeface="+mn-lt"/>
+        <a:ea typeface="+mn-ea"/>
+        <a:cs typeface="+mn-cs"/>
+      </a:defRPr>
+    </a:lvl6pPr>
+    <a:lvl7pPr marL="2743200" algn="l" defTabSz="914400" rtl="0" eaLnBrk="1" latinLnBrk="0" hangingPunct="1">
+      <a:defRPr sz="1200" kern="1200">
+        <a:solidFill>
+          <a:schemeClr val="tx1"/>
+        </a:solidFill>
+        <a:latin typeface="+mn-lt"/>
+        <a:ea typeface="+mn-ea"/>
+        <a:cs typeface="+mn-cs"/>
+      </a:defRPr>
+    </a:lvl7pPr>
+    <a:lvl8pPr marL="3200400" algn="l" defTabSz="914400" rtl="0" eaLnBrk="1" latinLnBrk="0" hangingPunct="1">
+      <a:defRPr sz="1200" kern="1200">
+        <a:solidFill>
+          <a:schemeClr val="tx1"/>
+        </a:solidFill>
+        <a:latin typeface="+mn-lt"/>
+        <a:ea typeface="+mn-ea"/>
+        <a:cs typeface="+mn-cs"/>
+      </a:defRPr>
+    </a:lvl8pPr>
+    <a:lvl9pPr marL="3657600" algn="l" defTabSz="914400" rtl="0" eaLnBrk="1" latinLnBrk="0" hangingPunct="1">
+      <a:defRPr sz="1200" kern="1200">
+        <a:solidFill>
+          <a:schemeClr val="tx1"/>
+        </a:solidFill>
+        <a:latin typeface="+mn-lt"/>
+        <a:ea typeface="+mn-ea"/>
+        <a:cs typeface="+mn-cs"/>
+      </a:defRPr>
+    </a:lvl9pPr>
+  </p:notesStyle>
+</p:notesMaster>
+</file>
+
+<file path=ppt/notesSlides/notesSlide1.xml><?xml version="1.0" encoding="utf-8"?>
+<p:notes xmlns:a="http://schemas.openxmlformats.org/drawingml/2006/main" xmlns:r="http://schemas.openxmlformats.org/officeDocument/2006/relationships" xmlns:p="http://schemas.openxmlformats.org/presentationml/2006/main">
+  <p:cSld>
+    <p:spTree>
+      <p:nvGrpSpPr>
+        <p:cNvPr id="1" name=""/>
+        <p:cNvGrpSpPr/>
+        <p:nvPr/>
+      </p:nvGrpSpPr>
+      <p:grpSpPr>
+        <a:xfrm>
+          <a:off x="0" y="0"/>
+          <a:ext cx="0" cy="0"/>
+          <a:chOff x="0" y="0"/>
+          <a:chExt cx="0" cy="0"/>
+        </a:xfrm>
+      </p:grpSpPr>
+      <p:sp>
+        <p:nvSpPr>
+          <p:cNvPr id="2" name="Slide Image Placeholder 1"/>
+          <p:cNvSpPr>
+            <a:spLocks noGrp="1" noRot="1" noChangeAspect="1"/>
+          </p:cNvSpPr>
+          <p:nvPr>
+            <p:ph type="sldImg"/>
+          </p:nvPr>
+        </p:nvSpPr>
+        <p:spPr/>
+      </p:sp>
+      <p:sp>
+        <p:nvSpPr>
+          <p:cNvPr id="3" name="Notes Placeholder 2"/>
+          <p:cNvSpPr>
+            <a:spLocks noGrp="1"/>
+          </p:cNvSpPr>
+          <p:nvPr>
+            <p:ph type="body" idx="1"/>
+          </p:nvPr>
+        </p:nvSpPr>
+        <p:spPr/>
+        <p:txBody>
+          <a:bodyPr/>
+          <a:lstStyle/>
+          <a:p>
+            <a:r>
+              <a:rPr lang="en-US" dirty="0" smtClean="0"/>
+              <a:t>Potentially not doing between-subject</a:t>
+            </a:r>
+            <a:r>
+              <a:rPr lang="en-US" baseline="0" dirty="0" smtClean="0"/>
+              <a:t> normalization and spatial smoothing</a:t>
+            </a:r>
+            <a:endParaRPr lang="en-US" dirty="0"/>
+          </a:p>
+        </p:txBody>
+      </p:sp>
+      <p:sp>
+        <p:nvSpPr>
+          <p:cNvPr id="4" name="Slide Number Placeholder 3"/>
+          <p:cNvSpPr>
+            <a:spLocks noGrp="1"/>
+          </p:cNvSpPr>
+          <p:nvPr>
+            <p:ph type="sldNum" sz="quarter" idx="10"/>
+          </p:nvPr>
+        </p:nvSpPr>
+        <p:spPr/>
+        <p:txBody>
+          <a:bodyPr/>
+          <a:lstStyle/>
+          <a:p>
+            <a:fld id="{87E6E711-D72A-E943-B62C-1DB873B9CC75}" type="slidenum">
+              <a:rPr lang="en-US" smtClean="0"/>
+              <a:t>9</a:t>
+            </a:fld>
+            <a:endParaRPr lang="en-US"/>
+          </a:p>
+        </p:txBody>
+      </p:sp>
+    </p:spTree>
+    <p:extLst>
+      <p:ext uri="{BB962C8B-B14F-4D97-AF65-F5344CB8AC3E}">
+        <p14:creationId xmlns:p14="http://schemas.microsoft.com/office/powerpoint/2010/main" val="385649168"/>
+      </p:ext>
+    </p:extLst>
+  </p:cSld>
+  <p:clrMapOvr>
+    <a:masterClrMapping/>
+  </p:clrMapOvr>
+</p:notes>
+</file>
+
+<file path=ppt/notesSlides/notesSlide2.xml><?xml version="1.0" encoding="utf-8"?>
+<p:notes xmlns:a="http://schemas.openxmlformats.org/drawingml/2006/main" xmlns:r="http://schemas.openxmlformats.org/officeDocument/2006/relationships" xmlns:p="http://schemas.openxmlformats.org/presentationml/2006/main">
+  <p:cSld>
+    <p:spTree>
+      <p:nvGrpSpPr>
+        <p:cNvPr id="1" name=""/>
+        <p:cNvGrpSpPr/>
+        <p:nvPr/>
+      </p:nvGrpSpPr>
+      <p:grpSpPr>
+        <a:xfrm>
+          <a:off x="0" y="0"/>
+          <a:ext cx="0" cy="0"/>
+          <a:chOff x="0" y="0"/>
+          <a:chExt cx="0" cy="0"/>
+        </a:xfrm>
+      </p:grpSpPr>
+      <p:sp>
+        <p:nvSpPr>
+          <p:cNvPr id="2" name="Slide Image Placeholder 1"/>
+          <p:cNvSpPr>
+            <a:spLocks noGrp="1" noRot="1" noChangeAspect="1"/>
+          </p:cNvSpPr>
+          <p:nvPr>
+            <p:ph type="sldImg"/>
+          </p:nvPr>
+        </p:nvSpPr>
+        <p:spPr/>
+      </p:sp>
+      <p:sp>
+        <p:nvSpPr>
+          <p:cNvPr id="3" name="Notes Placeholder 2"/>
+          <p:cNvSpPr>
+            <a:spLocks noGrp="1"/>
+          </p:cNvSpPr>
+          <p:nvPr>
+            <p:ph type="body" idx="1"/>
+          </p:nvPr>
+        </p:nvSpPr>
+        <p:spPr/>
+        <p:txBody>
+          <a:bodyPr/>
+          <a:lstStyle/>
+          <a:p>
+            <a:endParaRPr lang="en-US" dirty="0"/>
+          </a:p>
+        </p:txBody>
+      </p:sp>
+      <p:sp>
+        <p:nvSpPr>
+          <p:cNvPr id="4" name="Slide Number Placeholder 3"/>
+          <p:cNvSpPr>
+            <a:spLocks noGrp="1"/>
+          </p:cNvSpPr>
+          <p:nvPr>
+            <p:ph type="sldNum" sz="quarter" idx="10"/>
+          </p:nvPr>
+        </p:nvSpPr>
+        <p:spPr/>
+        <p:txBody>
+          <a:bodyPr/>
+          <a:lstStyle/>
+          <a:p>
+            <a:fld id="{87E6E711-D72A-E943-B62C-1DB873B9CC75}" type="slidenum">
+              <a:rPr lang="en-US" smtClean="0"/>
+              <a:t>12</a:t>
+            </a:fld>
+            <a:endParaRPr lang="en-US"/>
+          </a:p>
+        </p:txBody>
+      </p:sp>
+    </p:spTree>
+    <p:extLst>
+      <p:ext uri="{BB962C8B-B14F-4D97-AF65-F5344CB8AC3E}">
+        <p14:creationId xmlns:p14="http://schemas.microsoft.com/office/powerpoint/2010/main" val="676263437"/>
+      </p:ext>
+    </p:extLst>
+  </p:cSld>
+  <p:clrMapOvr>
+    <a:masterClrMapping/>
+  </p:clrMapOvr>
+</p:notes>
 </file>
 
 <file path=ppt/slideLayouts/slideLayout1.xml><?xml version="1.0" encoding="utf-8"?>
@@ -298,7 +847,7 @@
             <a:fld id="{2FFCD221-4BAF-B549-AD57-3A98595157F2}" type="datetimeFigureOut">
               <a:rPr lang="en-US" smtClean="0"/>
               <a:pPr/>
-              <a:t>10/31/2016</a:t>
+              <a:t>11/15/16</a:t>
             </a:fld>
             <a:endParaRPr lang="en-US"/>
           </a:p>
@@ -350,7 +899,7 @@
     </p:spTree>
     <p:extLst>
       <p:ext uri="{BB962C8B-B14F-4D97-AF65-F5344CB8AC3E}">
-        <p14:creationId xmlns:p14="http://schemas.microsoft.com/office/powerpoint/2010/main" xmlns="" val="2748312729"/>
+        <p14:creationId xmlns:p14="http://schemas.microsoft.com/office/powerpoint/2010/main" val="2748312729"/>
       </p:ext>
     </p:extLst>
   </p:cSld>
@@ -470,7 +1019,7 @@
             <a:fld id="{2FFCD221-4BAF-B549-AD57-3A98595157F2}" type="datetimeFigureOut">
               <a:rPr lang="en-US" smtClean="0"/>
               <a:pPr/>
-              <a:t>10/31/2016</a:t>
+              <a:t>11/15/16</a:t>
             </a:fld>
             <a:endParaRPr lang="en-US"/>
           </a:p>
@@ -522,7 +1071,7 @@
     </p:spTree>
     <p:extLst>
       <p:ext uri="{BB962C8B-B14F-4D97-AF65-F5344CB8AC3E}">
-        <p14:creationId xmlns:p14="http://schemas.microsoft.com/office/powerpoint/2010/main" xmlns="" val="3280191056"/>
+        <p14:creationId xmlns:p14="http://schemas.microsoft.com/office/powerpoint/2010/main" val="3280191056"/>
       </p:ext>
     </p:extLst>
   </p:cSld>
@@ -652,7 +1201,7 @@
             <a:fld id="{2FFCD221-4BAF-B549-AD57-3A98595157F2}" type="datetimeFigureOut">
               <a:rPr lang="en-US" smtClean="0"/>
               <a:pPr/>
-              <a:t>10/31/2016</a:t>
+              <a:t>11/15/16</a:t>
             </a:fld>
             <a:endParaRPr lang="en-US"/>
           </a:p>
@@ -704,7 +1253,7 @@
     </p:spTree>
     <p:extLst>
       <p:ext uri="{BB962C8B-B14F-4D97-AF65-F5344CB8AC3E}">
-        <p14:creationId xmlns:p14="http://schemas.microsoft.com/office/powerpoint/2010/main" xmlns="" val="1172697896"/>
+        <p14:creationId xmlns:p14="http://schemas.microsoft.com/office/powerpoint/2010/main" val="1172697896"/>
       </p:ext>
     </p:extLst>
   </p:cSld>
@@ -824,7 +1373,7 @@
             <a:fld id="{2FFCD221-4BAF-B549-AD57-3A98595157F2}" type="datetimeFigureOut">
               <a:rPr lang="en-US" smtClean="0"/>
               <a:pPr/>
-              <a:t>10/31/2016</a:t>
+              <a:t>11/15/16</a:t>
             </a:fld>
             <a:endParaRPr lang="en-US"/>
           </a:p>
@@ -876,7 +1425,7 @@
     </p:spTree>
     <p:extLst>
       <p:ext uri="{BB962C8B-B14F-4D97-AF65-F5344CB8AC3E}">
-        <p14:creationId xmlns:p14="http://schemas.microsoft.com/office/powerpoint/2010/main" xmlns="" val="2209956329"/>
+        <p14:creationId xmlns:p14="http://schemas.microsoft.com/office/powerpoint/2010/main" val="2209956329"/>
       </p:ext>
     </p:extLst>
   </p:cSld>
@@ -1072,7 +1621,7 @@
             <a:fld id="{2FFCD221-4BAF-B549-AD57-3A98595157F2}" type="datetimeFigureOut">
               <a:rPr lang="en-US" smtClean="0"/>
               <a:pPr/>
-              <a:t>10/31/2016</a:t>
+              <a:t>11/15/16</a:t>
             </a:fld>
             <a:endParaRPr lang="en-US"/>
           </a:p>
@@ -1124,7 +1673,7 @@
     </p:spTree>
     <p:extLst>
       <p:ext uri="{BB962C8B-B14F-4D97-AF65-F5344CB8AC3E}">
-        <p14:creationId xmlns:p14="http://schemas.microsoft.com/office/powerpoint/2010/main" xmlns="" val="2998734526"/>
+        <p14:creationId xmlns:p14="http://schemas.microsoft.com/office/powerpoint/2010/main" val="2998734526"/>
       </p:ext>
     </p:extLst>
   </p:cSld>
@@ -1362,7 +1911,7 @@
             <a:fld id="{2FFCD221-4BAF-B549-AD57-3A98595157F2}" type="datetimeFigureOut">
               <a:rPr lang="en-US" smtClean="0"/>
               <a:pPr/>
-              <a:t>10/31/2016</a:t>
+              <a:t>11/15/16</a:t>
             </a:fld>
             <a:endParaRPr lang="en-US"/>
           </a:p>
@@ -1414,7 +1963,7 @@
     </p:spTree>
     <p:extLst>
       <p:ext uri="{BB962C8B-B14F-4D97-AF65-F5344CB8AC3E}">
-        <p14:creationId xmlns:p14="http://schemas.microsoft.com/office/powerpoint/2010/main" xmlns="" val="1545289543"/>
+        <p14:creationId xmlns:p14="http://schemas.microsoft.com/office/powerpoint/2010/main" val="1545289543"/>
       </p:ext>
     </p:extLst>
   </p:cSld>
@@ -1786,7 +2335,7 @@
             <a:fld id="{2FFCD221-4BAF-B549-AD57-3A98595157F2}" type="datetimeFigureOut">
               <a:rPr lang="en-US" smtClean="0"/>
               <a:pPr/>
-              <a:t>10/31/2016</a:t>
+              <a:t>11/15/16</a:t>
             </a:fld>
             <a:endParaRPr lang="en-US"/>
           </a:p>
@@ -1838,7 +2387,7 @@
     </p:spTree>
     <p:extLst>
       <p:ext uri="{BB962C8B-B14F-4D97-AF65-F5344CB8AC3E}">
-        <p14:creationId xmlns:p14="http://schemas.microsoft.com/office/powerpoint/2010/main" xmlns="" val="302065180"/>
+        <p14:creationId xmlns:p14="http://schemas.microsoft.com/office/powerpoint/2010/main" val="302065180"/>
       </p:ext>
     </p:extLst>
   </p:cSld>
@@ -1906,7 +2455,7 @@
             <a:fld id="{2FFCD221-4BAF-B549-AD57-3A98595157F2}" type="datetimeFigureOut">
               <a:rPr lang="en-US" smtClean="0"/>
               <a:pPr/>
-              <a:t>10/31/2016</a:t>
+              <a:t>11/15/16</a:t>
             </a:fld>
             <a:endParaRPr lang="en-US"/>
           </a:p>
@@ -1958,7 +2507,7 @@
     </p:spTree>
     <p:extLst>
       <p:ext uri="{BB962C8B-B14F-4D97-AF65-F5344CB8AC3E}">
-        <p14:creationId xmlns:p14="http://schemas.microsoft.com/office/powerpoint/2010/main" xmlns="" val="4043900700"/>
+        <p14:creationId xmlns:p14="http://schemas.microsoft.com/office/powerpoint/2010/main" val="4043900700"/>
       </p:ext>
     </p:extLst>
   </p:cSld>
@@ -2003,7 +2552,7 @@
             <a:fld id="{2FFCD221-4BAF-B549-AD57-3A98595157F2}" type="datetimeFigureOut">
               <a:rPr lang="en-US" smtClean="0"/>
               <a:pPr/>
-              <a:t>10/31/2016</a:t>
+              <a:t>11/15/16</a:t>
             </a:fld>
             <a:endParaRPr lang="en-US"/>
           </a:p>
@@ -2055,7 +2604,7 @@
     </p:spTree>
     <p:extLst>
       <p:ext uri="{BB962C8B-B14F-4D97-AF65-F5344CB8AC3E}">
-        <p14:creationId xmlns:p14="http://schemas.microsoft.com/office/powerpoint/2010/main" xmlns="" val="2151557169"/>
+        <p14:creationId xmlns:p14="http://schemas.microsoft.com/office/powerpoint/2010/main" val="2151557169"/>
       </p:ext>
     </p:extLst>
   </p:cSld>
@@ -2282,7 +2831,7 @@
             <a:fld id="{2FFCD221-4BAF-B549-AD57-3A98595157F2}" type="datetimeFigureOut">
               <a:rPr lang="en-US" smtClean="0"/>
               <a:pPr/>
-              <a:t>10/31/2016</a:t>
+              <a:t>11/15/16</a:t>
             </a:fld>
             <a:endParaRPr lang="en-US"/>
           </a:p>
@@ -2334,7 +2883,7 @@
     </p:spTree>
     <p:extLst>
       <p:ext uri="{BB962C8B-B14F-4D97-AF65-F5344CB8AC3E}">
-        <p14:creationId xmlns:p14="http://schemas.microsoft.com/office/powerpoint/2010/main" xmlns="" val="720569034"/>
+        <p14:creationId xmlns:p14="http://schemas.microsoft.com/office/powerpoint/2010/main" val="720569034"/>
       </p:ext>
     </p:extLst>
   </p:cSld>
@@ -2537,7 +3086,7 @@
             <a:fld id="{2FFCD221-4BAF-B549-AD57-3A98595157F2}" type="datetimeFigureOut">
               <a:rPr lang="en-US" smtClean="0"/>
               <a:pPr/>
-              <a:t>10/31/2016</a:t>
+              <a:t>11/15/16</a:t>
             </a:fld>
             <a:endParaRPr lang="en-US"/>
           </a:p>
@@ -2589,7 +3138,7 @@
     </p:spTree>
     <p:extLst>
       <p:ext uri="{BB962C8B-B14F-4D97-AF65-F5344CB8AC3E}">
-        <p14:creationId xmlns:p14="http://schemas.microsoft.com/office/powerpoint/2010/main" xmlns="" val="2191495314"/>
+        <p14:creationId xmlns:p14="http://schemas.microsoft.com/office/powerpoint/2010/main" val="2191495314"/>
       </p:ext>
     </p:extLst>
   </p:cSld>
@@ -2752,7 +3301,7 @@
             <a:fld id="{2FFCD221-4BAF-B549-AD57-3A98595157F2}" type="datetimeFigureOut">
               <a:rPr lang="en-US" smtClean="0"/>
               <a:pPr/>
-              <a:t>10/31/2016</a:t>
+              <a:t>11/15/16</a:t>
             </a:fld>
             <a:endParaRPr lang="en-US"/>
           </a:p>
@@ -2840,7 +3389,7 @@
     </p:spTree>
     <p:extLst>
       <p:ext uri="{BB962C8B-B14F-4D97-AF65-F5344CB8AC3E}">
-        <p14:creationId xmlns:p14="http://schemas.microsoft.com/office/powerpoint/2010/main" xmlns="" val="4249517459"/>
+        <p14:creationId xmlns:p14="http://schemas.microsoft.com/office/powerpoint/2010/main" val="4249517459"/>
       </p:ext>
     </p:extLst>
   </p:cSld>
@@ -3188,7 +3737,7 @@
                   <a:schemeClr val="tx1"/>
                 </a:solidFill>
               </a:rPr>
-              <a:t> and Joe</a:t>
+              <a:t>, and Joe</a:t>
             </a:r>
           </a:p>
           <a:p>
@@ -3218,13 +3767,20 @@
     </p:spTree>
     <p:extLst>
       <p:ext uri="{BB962C8B-B14F-4D97-AF65-F5344CB8AC3E}">
-        <p14:creationId xmlns:p14="http://schemas.microsoft.com/office/powerpoint/2010/main" xmlns="" val="3206939814"/>
+        <p14:creationId xmlns:p14="http://schemas.microsoft.com/office/powerpoint/2010/main" val="3206939814"/>
       </p:ext>
     </p:extLst>
   </p:cSld>
   <p:clrMapOvr>
     <a:masterClrMapping/>
   </p:clrMapOvr>
+  <p:timing>
+    <p:tnLst>
+      <p:par>
+        <p:cTn id="1" dur="indefinite" restart="never" nodeType="tmRoot"/>
+      </p:par>
+    </p:tnLst>
+  </p:timing>
 </p:sld>
 </file>
 
@@ -3255,19 +3811,14 @@
             <p:ph type="title"/>
           </p:nvPr>
         </p:nvSpPr>
-        <p:spPr>
-          <a:xfrm>
-            <a:off x="407581" y="-70921"/>
-            <a:ext cx="8229600" cy="1143000"/>
-          </a:xfrm>
-        </p:spPr>
-        <p:txBody>
-          <a:bodyPr/>
-          <a:lstStyle/>
-          <a:p>
-            <a:r>
-              <a:rPr lang="en-US" dirty="0" smtClean="0"/>
-              <a:t>Preliminary planned Workflow</a:t>
+        <p:spPr/>
+        <p:txBody>
+          <a:bodyPr/>
+          <a:lstStyle/>
+          <a:p>
+            <a:r>
+              <a:rPr lang="en-US" dirty="0" smtClean="0"/>
+              <a:t>First-level analysis (ROI analysis)</a:t>
             </a:r>
             <a:endParaRPr lang="en-US" dirty="0"/>
           </a:p>
@@ -3283,176 +3834,518 @@
             <p:ph idx="1"/>
           </p:nvPr>
         </p:nvSpPr>
-        <p:spPr>
-          <a:xfrm>
-            <a:off x="407581" y="891364"/>
-            <a:ext cx="8229600" cy="4525963"/>
-          </a:xfrm>
-        </p:spPr>
+        <p:spPr/>
         <p:txBody>
           <a:bodyPr>
-            <a:normAutofit fontScale="85000" lnSpcReduction="10000"/>
+            <a:normAutofit fontScale="92500" lnSpcReduction="20000"/>
           </a:bodyPr>
           <a:lstStyle/>
           <a:p>
             <a:r>
               <a:rPr lang="en-US" dirty="0" smtClean="0"/>
-              <a:t>Outlier detection</a:t>
-            </a:r>
-          </a:p>
-          <a:p>
-            <a:endParaRPr lang="en-US" dirty="0" smtClean="0"/>
-          </a:p>
-          <a:p>
-            <a:r>
-              <a:rPr lang="en-US" dirty="0" smtClean="0"/>
-              <a:t>Extraction of relevant </a:t>
-            </a:r>
-            <a:r>
-              <a:rPr lang="en-US" dirty="0" err="1" smtClean="0"/>
-              <a:t>voxel</a:t>
-            </a:r>
-            <a:r>
-              <a:rPr lang="en-US" dirty="0" smtClean="0"/>
-              <a:t> or VOI (volumes of interest)</a:t>
-            </a:r>
-          </a:p>
-          <a:p>
-            <a:endParaRPr lang="en-US" dirty="0" smtClean="0"/>
-          </a:p>
-          <a:p>
-            <a:r>
-              <a:rPr lang="en-US" dirty="0" smtClean="0"/>
-              <a:t>Statistical modeling of BOLD signals to task data (Brain response modeling)</a:t>
-            </a:r>
-          </a:p>
-          <a:p>
-            <a:pPr lvl="1"/>
-            <a:r>
-              <a:rPr lang="en-US" dirty="0" smtClean="0"/>
-              <a:t>Normalization of </a:t>
-            </a:r>
-            <a:r>
-              <a:rPr lang="en-US" dirty="0" err="1" smtClean="0"/>
-              <a:t>fMRI</a:t>
-            </a:r>
-            <a:r>
-              <a:rPr lang="en-US" dirty="0" smtClean="0"/>
-              <a:t> BOLD amplitude </a:t>
-            </a:r>
-          </a:p>
-          <a:p>
-            <a:pPr lvl="1"/>
-            <a:r>
-              <a:rPr lang="en-US" dirty="0" smtClean="0"/>
-              <a:t>Minimize the baseline difference across individuals</a:t>
-            </a:r>
-          </a:p>
-          <a:p>
-            <a:pPr lvl="1"/>
-            <a:r>
-              <a:rPr lang="en-US" dirty="0" smtClean="0"/>
-              <a:t>GLM  for individual </a:t>
-            </a:r>
-            <a:r>
-              <a:rPr lang="en-US" dirty="0" err="1" smtClean="0"/>
-              <a:t>vovel’s</a:t>
-            </a:r>
-            <a:r>
-              <a:rPr lang="en-US" dirty="0" smtClean="0"/>
-              <a:t> </a:t>
-            </a:r>
-            <a:r>
-              <a:rPr lang="en-US" dirty="0" err="1" smtClean="0"/>
-              <a:t>fMRI</a:t>
-            </a:r>
-            <a:r>
-              <a:rPr lang="en-US" dirty="0" smtClean="0"/>
-              <a:t> BOLD time series and the fitted parameters will be used to explain the functional activities of </a:t>
-            </a:r>
-            <a:r>
-              <a:rPr lang="en-US" dirty="0" err="1" smtClean="0"/>
-              <a:t>voxels</a:t>
-            </a:r>
-            <a:r>
-              <a:rPr lang="en-US" dirty="0" smtClean="0"/>
-              <a:t>.</a:t>
-            </a:r>
-          </a:p>
-          <a:p>
-            <a:pPr lvl="1"/>
-            <a:endParaRPr lang="en-US" dirty="0" smtClean="0"/>
-          </a:p>
-          <a:p>
-            <a:endParaRPr lang="en-US" dirty="0" smtClean="0"/>
-          </a:p>
-        </p:txBody>
-      </p:sp>
-      <p:pic>
-        <p:nvPicPr>
-          <p:cNvPr id="4" name="Picture 2" descr="http://ssp.dml.ir/wp-content/uploads/2013/07/braindecodingsample.jpg"/>
-          <p:cNvPicPr>
-            <a:picLocks noChangeAspect="1" noChangeArrowheads="1"/>
-          </p:cNvPicPr>
-          <p:nvPr/>
-        </p:nvPicPr>
-        <p:blipFill>
-          <a:blip r:embed="rId2"/>
-          <a:srcRect/>
-          <a:stretch>
-            <a:fillRect/>
-          </a:stretch>
-        </p:blipFill>
-        <p:spPr bwMode="auto">
-          <a:xfrm>
-            <a:off x="1903228" y="5417327"/>
-            <a:ext cx="4121888" cy="1189982"/>
-          </a:xfrm>
-          <a:prstGeom prst="rect">
-            <a:avLst/>
-          </a:prstGeom>
-          <a:noFill/>
-        </p:spPr>
-      </p:pic>
-      <p:sp>
-        <p:nvSpPr>
-          <p:cNvPr id="5" name="Rectangle 4"/>
-          <p:cNvSpPr/>
-          <p:nvPr/>
-        </p:nvSpPr>
-        <p:spPr>
-          <a:xfrm>
-            <a:off x="1984871" y="6607309"/>
-            <a:ext cx="5778347" cy="246221"/>
-          </a:xfrm>
-          <a:prstGeom prst="rect">
-            <a:avLst/>
-          </a:prstGeom>
-        </p:spPr>
-        <p:txBody>
-          <a:bodyPr wrap="square">
-            <a:spAutoFit/>
-          </a:bodyPr>
-          <a:lstStyle/>
-          <a:p>
-            <a:r>
-              <a:rPr lang="en-US" sz="1000" dirty="0" smtClean="0"/>
-              <a:t>http://ssp.dml.ir/wp-content/uploads/2013/07/braindecodingsample.jpg</a:t>
-            </a:r>
-            <a:endParaRPr lang="en-US" sz="1000" dirty="0"/>
+              <a:t>Mask data to only include voxels within brain</a:t>
+            </a:r>
+          </a:p>
+          <a:p>
+            <a:r>
+              <a:rPr lang="en-US" dirty="0" smtClean="0"/>
+              <a:t>Fit fMRI BOLD time series from each voxel with event time series to obtain beta </a:t>
+            </a:r>
+            <a:r>
+              <a:rPr lang="en-US" dirty="0" smtClean="0"/>
+              <a:t>maps</a:t>
+            </a:r>
+          </a:p>
+          <a:p>
+            <a:r>
+              <a:rPr lang="en-US" dirty="0" smtClean="0"/>
+              <a:t>Compute contrast map for first run</a:t>
+            </a:r>
+          </a:p>
+          <a:p>
+            <a:endParaRPr lang="en-US" dirty="0"/>
+          </a:p>
+          <a:p>
+            <a:r>
+              <a:rPr lang="en-US" dirty="0" smtClean="0"/>
+              <a:t>Mask data to include voxels from first run analysis</a:t>
+            </a:r>
+          </a:p>
+          <a:p>
+            <a:r>
+              <a:rPr lang="en-US" dirty="0" smtClean="0"/>
+              <a:t>Fit fMRI BOLD time series from voxels with event time series for second run to obtain beta map</a:t>
+            </a:r>
+          </a:p>
+          <a:p>
+            <a:r>
+              <a:rPr lang="en-US" dirty="0" smtClean="0"/>
+              <a:t>Compute contrast map for second run</a:t>
+            </a:r>
+          </a:p>
+          <a:p>
+            <a:r>
+              <a:rPr lang="en-US" dirty="0" smtClean="0"/>
+              <a:t>Extract mean signal from each contrast map</a:t>
+            </a:r>
+            <a:endParaRPr lang="en-US" dirty="0"/>
           </a:p>
         </p:txBody>
       </p:sp>
     </p:spTree>
     <p:extLst>
       <p:ext uri="{BB962C8B-B14F-4D97-AF65-F5344CB8AC3E}">
-        <p14:creationId xmlns:p14="http://schemas.microsoft.com/office/powerpoint/2010/main" xmlns="" val="1255414466"/>
+        <p14:creationId xmlns:p14="http://schemas.microsoft.com/office/powerpoint/2010/main" val="650603575"/>
       </p:ext>
     </p:extLst>
   </p:cSld>
   <p:clrMapOvr>
     <a:masterClrMapping/>
   </p:clrMapOvr>
+  <p:timing>
+    <p:tnLst>
+      <p:par>
+        <p:cTn id="1" dur="indefinite" restart="never" nodeType="tmRoot"/>
+      </p:par>
+    </p:tnLst>
+  </p:timing>
+</p:sld>
+</file>
+
+<file path=ppt/slides/slide11.xml><?xml version="1.0" encoding="utf-8"?>
+<p:sld xmlns:a="http://schemas.openxmlformats.org/drawingml/2006/main" xmlns:r="http://schemas.openxmlformats.org/officeDocument/2006/relationships" xmlns:p="http://schemas.openxmlformats.org/presentationml/2006/main">
+  <p:cSld>
+    <p:spTree>
+      <p:nvGrpSpPr>
+        <p:cNvPr id="1" name=""/>
+        <p:cNvGrpSpPr/>
+        <p:nvPr/>
+      </p:nvGrpSpPr>
+      <p:grpSpPr>
+        <a:xfrm>
+          <a:off x="0" y="0"/>
+          <a:ext cx="0" cy="0"/>
+          <a:chOff x="0" y="0"/>
+          <a:chExt cx="0" cy="0"/>
+        </a:xfrm>
+      </p:grpSpPr>
+      <p:sp>
+        <p:nvSpPr>
+          <p:cNvPr id="2" name="Title 1"/>
+          <p:cNvSpPr>
+            <a:spLocks noGrp="1"/>
+          </p:cNvSpPr>
+          <p:nvPr>
+            <p:ph type="title"/>
+          </p:nvPr>
+        </p:nvSpPr>
+        <p:spPr/>
+        <p:txBody>
+          <a:bodyPr/>
+          <a:lstStyle/>
+          <a:p>
+            <a:r>
+              <a:rPr lang="en-US" dirty="0" smtClean="0"/>
+              <a:t>Second-level analysis (ROI analysis)</a:t>
+            </a:r>
+            <a:endParaRPr lang="en-US" dirty="0"/>
+          </a:p>
+        </p:txBody>
+      </p:sp>
+      <p:sp>
+        <p:nvSpPr>
+          <p:cNvPr id="3" name="Content Placeholder 2"/>
+          <p:cNvSpPr>
+            <a:spLocks noGrp="1"/>
+          </p:cNvSpPr>
+          <p:nvPr>
+            <p:ph idx="1"/>
+          </p:nvPr>
+        </p:nvSpPr>
+        <p:spPr/>
+        <p:txBody>
+          <a:bodyPr/>
+          <a:lstStyle/>
+          <a:p>
+            <a:r>
+              <a:rPr lang="en-US" dirty="0" smtClean="0"/>
+              <a:t>Compute t </a:t>
+            </a:r>
+            <a:r>
+              <a:rPr lang="en-US" dirty="0" smtClean="0"/>
+              <a:t>statistics</a:t>
+            </a:r>
+          </a:p>
+          <a:p>
+            <a:r>
+              <a:rPr lang="en-US" dirty="0" smtClean="0"/>
+              <a:t>Regress </a:t>
+            </a:r>
+            <a:r>
+              <a:rPr lang="en-US" dirty="0" smtClean="0"/>
+              <a:t>clinical </a:t>
+            </a:r>
+            <a:r>
+              <a:rPr lang="en-US" dirty="0" smtClean="0"/>
+              <a:t>scores</a:t>
+            </a:r>
+            <a:endParaRPr lang="en-US" dirty="0"/>
+          </a:p>
+        </p:txBody>
+      </p:sp>
+    </p:spTree>
+    <p:extLst>
+      <p:ext uri="{BB962C8B-B14F-4D97-AF65-F5344CB8AC3E}">
+        <p14:creationId xmlns:p14="http://schemas.microsoft.com/office/powerpoint/2010/main" val="1907671403"/>
+      </p:ext>
+    </p:extLst>
+  </p:cSld>
+  <p:clrMapOvr>
+    <a:masterClrMapping/>
+  </p:clrMapOvr>
+  <p:timing>
+    <p:tnLst>
+      <p:par>
+        <p:cTn id="1" dur="indefinite" restart="never" nodeType="tmRoot"/>
+      </p:par>
+    </p:tnLst>
+  </p:timing>
+</p:sld>
+</file>
+
+<file path=ppt/slides/slide12.xml><?xml version="1.0" encoding="utf-8"?>
+<p:sld xmlns:a="http://schemas.openxmlformats.org/drawingml/2006/main" xmlns:r="http://schemas.openxmlformats.org/officeDocument/2006/relationships" xmlns:p="http://schemas.openxmlformats.org/presentationml/2006/main">
+  <p:cSld>
+    <p:spTree>
+      <p:nvGrpSpPr>
+        <p:cNvPr id="1" name=""/>
+        <p:cNvGrpSpPr/>
+        <p:nvPr/>
+      </p:nvGrpSpPr>
+      <p:grpSpPr>
+        <a:xfrm>
+          <a:off x="0" y="0"/>
+          <a:ext cx="0" cy="0"/>
+          <a:chOff x="0" y="0"/>
+          <a:chExt cx="0" cy="0"/>
+        </a:xfrm>
+      </p:grpSpPr>
+      <p:sp>
+        <p:nvSpPr>
+          <p:cNvPr id="2" name="Title 1"/>
+          <p:cNvSpPr>
+            <a:spLocks noGrp="1"/>
+          </p:cNvSpPr>
+          <p:nvPr>
+            <p:ph type="title"/>
+          </p:nvPr>
+        </p:nvSpPr>
+        <p:spPr/>
+        <p:txBody>
+          <a:bodyPr>
+            <a:normAutofit/>
+          </a:bodyPr>
+          <a:lstStyle/>
+          <a:p>
+            <a:r>
+              <a:rPr lang="en-US" dirty="0"/>
+              <a:t>Preprocessing </a:t>
+            </a:r>
+            <a:r>
+              <a:rPr lang="en-US" dirty="0" smtClean="0"/>
+              <a:t>steps (whole brain)</a:t>
+            </a:r>
+            <a:endParaRPr lang="en-US" dirty="0"/>
+          </a:p>
+        </p:txBody>
+      </p:sp>
+      <p:sp>
+        <p:nvSpPr>
+          <p:cNvPr id="3" name="Content Placeholder 2"/>
+          <p:cNvSpPr>
+            <a:spLocks noGrp="1"/>
+          </p:cNvSpPr>
+          <p:nvPr>
+            <p:ph idx="1"/>
+          </p:nvPr>
+        </p:nvSpPr>
+        <p:spPr/>
+        <p:txBody>
+          <a:bodyPr/>
+          <a:lstStyle/>
+          <a:p>
+            <a:r>
+              <a:rPr lang="en-US" dirty="0"/>
+              <a:t>Outlier </a:t>
+            </a:r>
+            <a:r>
+              <a:rPr lang="en-US" dirty="0" smtClean="0"/>
+              <a:t>detection</a:t>
+            </a:r>
+          </a:p>
+          <a:p>
+            <a:r>
+              <a:rPr lang="en-US" dirty="0"/>
+              <a:t>Slice-timing </a:t>
+            </a:r>
+            <a:r>
+              <a:rPr lang="en-US" dirty="0" smtClean="0"/>
+              <a:t>correction</a:t>
+            </a:r>
+            <a:endParaRPr lang="en-US" dirty="0"/>
+          </a:p>
+          <a:p>
+            <a:r>
+              <a:rPr lang="en-US" dirty="0"/>
+              <a:t>Motion correction</a:t>
+            </a:r>
+            <a:endParaRPr lang="en-US" dirty="0" smtClean="0"/>
+          </a:p>
+          <a:p>
+            <a:r>
+              <a:rPr lang="en-US" dirty="0" smtClean="0"/>
+              <a:t>Within-subject registration</a:t>
+            </a:r>
+          </a:p>
+          <a:p>
+            <a:r>
+              <a:rPr lang="en-US" dirty="0" smtClean="0"/>
+              <a:t>Between-subject normalization</a:t>
+            </a:r>
+            <a:endParaRPr lang="en-US" dirty="0"/>
+          </a:p>
+          <a:p>
+            <a:r>
+              <a:rPr lang="en-US" dirty="0" smtClean="0"/>
+              <a:t>Spatial smoothing</a:t>
+            </a:r>
+          </a:p>
+        </p:txBody>
+      </p:sp>
+    </p:spTree>
+    <p:extLst>
+      <p:ext uri="{BB962C8B-B14F-4D97-AF65-F5344CB8AC3E}">
+        <p14:creationId xmlns:p14="http://schemas.microsoft.com/office/powerpoint/2010/main" val="1458443185"/>
+      </p:ext>
+    </p:extLst>
+  </p:cSld>
+  <p:clrMapOvr>
+    <a:masterClrMapping/>
+  </p:clrMapOvr>
+  <p:timing>
+    <p:tnLst>
+      <p:par>
+        <p:cTn id="1" dur="indefinite" restart="never" nodeType="tmRoot"/>
+      </p:par>
+    </p:tnLst>
+  </p:timing>
+</p:sld>
+</file>
+
+<file path=ppt/slides/slide13.xml><?xml version="1.0" encoding="utf-8"?>
+<p:sld xmlns:a="http://schemas.openxmlformats.org/drawingml/2006/main" xmlns:r="http://schemas.openxmlformats.org/officeDocument/2006/relationships" xmlns:p="http://schemas.openxmlformats.org/presentationml/2006/main">
+  <p:cSld>
+    <p:spTree>
+      <p:nvGrpSpPr>
+        <p:cNvPr id="1" name=""/>
+        <p:cNvGrpSpPr/>
+        <p:nvPr/>
+      </p:nvGrpSpPr>
+      <p:grpSpPr>
+        <a:xfrm>
+          <a:off x="0" y="0"/>
+          <a:ext cx="0" cy="0"/>
+          <a:chOff x="0" y="0"/>
+          <a:chExt cx="0" cy="0"/>
+        </a:xfrm>
+      </p:grpSpPr>
+      <p:sp>
+        <p:nvSpPr>
+          <p:cNvPr id="2" name="Title 1"/>
+          <p:cNvSpPr>
+            <a:spLocks noGrp="1"/>
+          </p:cNvSpPr>
+          <p:nvPr>
+            <p:ph type="title"/>
+          </p:nvPr>
+        </p:nvSpPr>
+        <p:spPr/>
+        <p:txBody>
+          <a:bodyPr/>
+          <a:lstStyle/>
+          <a:p>
+            <a:r>
+              <a:rPr lang="en-US" dirty="0" smtClean="0"/>
+              <a:t>First-level analysis (whole brain)</a:t>
+            </a:r>
+            <a:endParaRPr lang="en-US" dirty="0"/>
+          </a:p>
+        </p:txBody>
+      </p:sp>
+      <p:sp>
+        <p:nvSpPr>
+          <p:cNvPr id="3" name="Content Placeholder 2"/>
+          <p:cNvSpPr>
+            <a:spLocks noGrp="1"/>
+          </p:cNvSpPr>
+          <p:nvPr>
+            <p:ph idx="1"/>
+          </p:nvPr>
+        </p:nvSpPr>
+        <p:spPr/>
+        <p:txBody>
+          <a:bodyPr/>
+          <a:lstStyle/>
+          <a:p>
+            <a:r>
+              <a:rPr lang="en-US" dirty="0" smtClean="0"/>
+              <a:t>Mask data to only include voxels within brain</a:t>
+            </a:r>
+          </a:p>
+          <a:p>
+            <a:r>
+              <a:rPr lang="en-US" dirty="0" smtClean="0"/>
+              <a:t>Fit fMRI BOLD time series from each voxel with event time series to obtain beta maps</a:t>
+            </a:r>
+            <a:endParaRPr lang="en-US" dirty="0"/>
+          </a:p>
+          <a:p>
+            <a:r>
+              <a:rPr lang="en-US" dirty="0" smtClean="0"/>
+              <a:t>Compute contrast images from beta maps of interest</a:t>
+            </a:r>
+            <a:endParaRPr lang="en-US" dirty="0"/>
+          </a:p>
+        </p:txBody>
+      </p:sp>
+    </p:spTree>
+    <p:extLst>
+      <p:ext uri="{BB962C8B-B14F-4D97-AF65-F5344CB8AC3E}">
+        <p14:creationId xmlns:p14="http://schemas.microsoft.com/office/powerpoint/2010/main" val="1476125735"/>
+      </p:ext>
+    </p:extLst>
+  </p:cSld>
+  <p:clrMapOvr>
+    <a:masterClrMapping/>
+  </p:clrMapOvr>
+  <p:timing>
+    <p:tnLst>
+      <p:par>
+        <p:cTn id="1" dur="indefinite" restart="never" nodeType="tmRoot"/>
+      </p:par>
+    </p:tnLst>
+  </p:timing>
+</p:sld>
+</file>
+
+<file path=ppt/slides/slide14.xml><?xml version="1.0" encoding="utf-8"?>
+<p:sld xmlns:a="http://schemas.openxmlformats.org/drawingml/2006/main" xmlns:r="http://schemas.openxmlformats.org/officeDocument/2006/relationships" xmlns:p="http://schemas.openxmlformats.org/presentationml/2006/main">
+  <p:cSld>
+    <p:spTree>
+      <p:nvGrpSpPr>
+        <p:cNvPr id="1" name=""/>
+        <p:cNvGrpSpPr/>
+        <p:nvPr/>
+      </p:nvGrpSpPr>
+      <p:grpSpPr>
+        <a:xfrm>
+          <a:off x="0" y="0"/>
+          <a:ext cx="0" cy="0"/>
+          <a:chOff x="0" y="0"/>
+          <a:chExt cx="0" cy="0"/>
+        </a:xfrm>
+      </p:grpSpPr>
+      <p:sp>
+        <p:nvSpPr>
+          <p:cNvPr id="2" name="Title 1"/>
+          <p:cNvSpPr>
+            <a:spLocks noGrp="1"/>
+          </p:cNvSpPr>
+          <p:nvPr>
+            <p:ph type="title"/>
+          </p:nvPr>
+        </p:nvSpPr>
+        <p:spPr/>
+        <p:txBody>
+          <a:bodyPr/>
+          <a:lstStyle/>
+          <a:p>
+            <a:r>
+              <a:rPr lang="en-US" dirty="0" smtClean="0"/>
+              <a:t>Second-level analysis (whole brain)</a:t>
+            </a:r>
+            <a:endParaRPr lang="en-US" dirty="0"/>
+          </a:p>
+        </p:txBody>
+      </p:sp>
+      <p:sp>
+        <p:nvSpPr>
+          <p:cNvPr id="3" name="Content Placeholder 2"/>
+          <p:cNvSpPr>
+            <a:spLocks noGrp="1"/>
+          </p:cNvSpPr>
+          <p:nvPr>
+            <p:ph idx="1"/>
+          </p:nvPr>
+        </p:nvSpPr>
+        <p:spPr/>
+        <p:txBody>
+          <a:bodyPr/>
+          <a:lstStyle/>
+          <a:p>
+            <a:r>
+              <a:rPr lang="en-US" dirty="0" smtClean="0"/>
+              <a:t>Compute t maps using first-level contrasts</a:t>
+            </a:r>
+          </a:p>
+          <a:p>
+            <a:r>
+              <a:rPr lang="en-US" dirty="0" smtClean="0"/>
+              <a:t>Regress clinical scores with first-level contrasts</a:t>
+            </a:r>
+          </a:p>
+          <a:p>
+            <a:r>
+              <a:rPr lang="en-US" dirty="0" smtClean="0"/>
+              <a:t>Calculate t map from beta map</a:t>
+            </a:r>
+          </a:p>
+          <a:p>
+            <a:r>
+              <a:rPr lang="en-US" dirty="0" smtClean="0"/>
+              <a:t>Control for multiple comparisons using random </a:t>
+            </a:r>
+            <a:r>
+              <a:rPr lang="en-US" dirty="0"/>
+              <a:t>f</a:t>
+            </a:r>
+            <a:r>
+              <a:rPr lang="en-US" dirty="0" smtClean="0"/>
+              <a:t>ield correction</a:t>
+            </a:r>
+          </a:p>
+          <a:p>
+            <a:endParaRPr lang="en-US" dirty="0"/>
+          </a:p>
+        </p:txBody>
+      </p:sp>
+    </p:spTree>
+    <p:extLst>
+      <p:ext uri="{BB962C8B-B14F-4D97-AF65-F5344CB8AC3E}">
+        <p14:creationId xmlns:p14="http://schemas.microsoft.com/office/powerpoint/2010/main" val="1514138001"/>
+      </p:ext>
+    </p:extLst>
+  </p:cSld>
+  <p:clrMapOvr>
+    <a:masterClrMapping/>
+  </p:clrMapOvr>
+  <p:timing>
+    <p:tnLst>
+      <p:par>
+        <p:cTn id="1" dur="indefinite" restart="never" nodeType="tmRoot"/>
+      </p:par>
+    </p:tnLst>
+  </p:timing>
 </p:sld>
 </file>
 
@@ -3513,7 +4406,7 @@
           <a:p>
             <a:r>
               <a:rPr lang="en-US" dirty="0" smtClean="0"/>
-              <a:t>Encoding and retrieval - two critical and complementary angles for understanding the mechanism of neural codes in brain</a:t>
+              <a:t>Encoding and retrieval - two critical and complementary angles for understanding the mechanism of neural codes in the brain</a:t>
             </a:r>
           </a:p>
           <a:p>
@@ -3522,7 +4415,7 @@
           <a:p>
             <a:r>
               <a:rPr lang="en-US" dirty="0" smtClean="0"/>
-              <a:t>Goal: investigate the neural bases of discriminating images from perceived pictures in individuals with high visual imagery abilities</a:t>
+              <a:t>Goal: investigate the neural basis of discriminating images from perceived pictures in individuals with high visual imagery abilities</a:t>
             </a:r>
           </a:p>
           <a:p>
@@ -3542,13 +4435,20 @@
     </p:spTree>
     <p:extLst>
       <p:ext uri="{BB962C8B-B14F-4D97-AF65-F5344CB8AC3E}">
-        <p14:creationId xmlns:p14="http://schemas.microsoft.com/office/powerpoint/2010/main" xmlns="" val="356378589"/>
+        <p14:creationId xmlns:p14="http://schemas.microsoft.com/office/powerpoint/2010/main" val="356378589"/>
       </p:ext>
     </p:extLst>
   </p:cSld>
   <p:clrMapOvr>
     <a:masterClrMapping/>
   </p:clrMapOvr>
+  <p:timing>
+    <p:tnLst>
+      <p:par>
+        <p:cTn id="1" dur="indefinite" restart="never" nodeType="tmRoot"/>
+      </p:par>
+    </p:tnLst>
+  </p:timing>
 </p:sld>
 </file>
 
@@ -3629,28 +4529,27 @@
       </p:sp>
       <p:pic>
         <p:nvPicPr>
-          <p:cNvPr id="4" name="Picture 3" descr="Screen Shot 2016-10-16 at 1.56.38 PM.png"/>
+          <p:cNvPr id="5" name="Picture 4" descr="Screen Shot 2016-10-16 at 1.56.38 PM.png"/>
           <p:cNvPicPr>
             <a:picLocks noChangeAspect="1"/>
           </p:cNvPicPr>
           <p:nvPr/>
         </p:nvPicPr>
-        <p:blipFill>
+        <p:blipFill rotWithShape="1">
           <a:blip r:embed="rId2">
             <a:extLst>
               <a:ext uri="{28A0092B-C50C-407E-A947-70E740481C1C}">
-                <a14:useLocalDpi xmlns:a14="http://schemas.microsoft.com/office/drawing/2010/main" xmlns="" val="0"/>
+                <a14:useLocalDpi xmlns:a14="http://schemas.microsoft.com/office/drawing/2010/main" val="0"/>
               </a:ext>
             </a:extLst>
           </a:blip>
-          <a:stretch>
-            <a:fillRect/>
-          </a:stretch>
+          <a:srcRect t="5264"/>
+          <a:stretch/>
         </p:blipFill>
         <p:spPr>
           <a:xfrm>
-            <a:off x="1881839" y="3387454"/>
-            <a:ext cx="5409453" cy="3201885"/>
+            <a:off x="1881839" y="3750233"/>
+            <a:ext cx="5409453" cy="3033339"/>
           </a:xfrm>
           <a:prstGeom prst="rect">
             <a:avLst/>
@@ -3660,13 +4559,20 @@
     </p:spTree>
     <p:extLst>
       <p:ext uri="{BB962C8B-B14F-4D97-AF65-F5344CB8AC3E}">
-        <p14:creationId xmlns:p14="http://schemas.microsoft.com/office/powerpoint/2010/main" xmlns="" val="4115223507"/>
+        <p14:creationId xmlns:p14="http://schemas.microsoft.com/office/powerpoint/2010/main" val="4115223507"/>
       </p:ext>
     </p:extLst>
   </p:cSld>
   <p:clrMapOvr>
     <a:masterClrMapping/>
   </p:clrMapOvr>
+  <p:timing>
+    <p:tnLst>
+      <p:par>
+        <p:cTn id="1" dur="indefinite" restart="never" nodeType="tmRoot"/>
+      </p:par>
+    </p:tnLst>
+  </p:timing>
 </p:sld>
 </file>
 
@@ -3760,7 +4666,7 @@
           <a:blip r:embed="rId2">
             <a:extLst>
               <a:ext uri="{28A0092B-C50C-407E-A947-70E740481C1C}">
-                <a14:useLocalDpi xmlns:a14="http://schemas.microsoft.com/office/drawing/2010/main" xmlns="" val="0"/>
+                <a14:useLocalDpi xmlns:a14="http://schemas.microsoft.com/office/drawing/2010/main" val="0"/>
               </a:ext>
             </a:extLst>
           </a:blip>
@@ -3780,13 +4686,20 @@
     </p:spTree>
     <p:extLst>
       <p:ext uri="{BB962C8B-B14F-4D97-AF65-F5344CB8AC3E}">
-        <p14:creationId xmlns:p14="http://schemas.microsoft.com/office/powerpoint/2010/main" xmlns="" val="2559374199"/>
+        <p14:creationId xmlns:p14="http://schemas.microsoft.com/office/powerpoint/2010/main" val="2559374199"/>
       </p:ext>
     </p:extLst>
   </p:cSld>
   <p:clrMapOvr>
     <a:masterClrMapping/>
   </p:clrMapOvr>
+  <p:timing>
+    <p:tnLst>
+      <p:par>
+        <p:cTn id="1" dur="indefinite" restart="never" nodeType="tmRoot"/>
+      </p:par>
+    </p:tnLst>
+  </p:timing>
 </p:sld>
 </file>
 
@@ -3839,7 +4752,7 @@
           <p:nvPr>
             <p:extLst>
               <p:ext uri="{D42A27DB-BD31-4B8C-83A1-F6EECF244321}">
-                <p14:modId xmlns:p14="http://schemas.microsoft.com/office/powerpoint/2010/main" xmlns="" val="3154774735"/>
+                <p14:modId xmlns:p14="http://schemas.microsoft.com/office/powerpoint/2010/main" val="3154774735"/>
               </p:ext>
             </p:extLst>
           </p:nvPr>
@@ -4193,13 +5106,20 @@
     </p:spTree>
     <p:extLst>
       <p:ext uri="{BB962C8B-B14F-4D97-AF65-F5344CB8AC3E}">
-        <p14:creationId xmlns:p14="http://schemas.microsoft.com/office/powerpoint/2010/main" xmlns="" val="3692776483"/>
+        <p14:creationId xmlns:p14="http://schemas.microsoft.com/office/powerpoint/2010/main" val="3692776483"/>
       </p:ext>
     </p:extLst>
   </p:cSld>
   <p:clrMapOvr>
     <a:masterClrMapping/>
   </p:clrMapOvr>
+  <p:timing>
+    <p:tnLst>
+      <p:par>
+        <p:cTn id="1" dur="indefinite" restart="never" nodeType="tmRoot"/>
+      </p:par>
+    </p:tnLst>
+  </p:timing>
 </p:sld>
 </file>
 
@@ -4311,13 +5231,20 @@
     </p:spTree>
     <p:extLst>
       <p:ext uri="{BB962C8B-B14F-4D97-AF65-F5344CB8AC3E}">
-        <p14:creationId xmlns:p14="http://schemas.microsoft.com/office/powerpoint/2010/main" xmlns="" val="1981491652"/>
+        <p14:creationId xmlns:p14="http://schemas.microsoft.com/office/powerpoint/2010/main" val="1981491652"/>
       </p:ext>
     </p:extLst>
   </p:cSld>
   <p:clrMapOvr>
     <a:masterClrMapping/>
   </p:clrMapOvr>
+  <p:timing>
+    <p:tnLst>
+      <p:par>
+        <p:cTn id="1" dur="indefinite" restart="never" nodeType="tmRoot"/>
+      </p:par>
+    </p:tnLst>
+  </p:timing>
 </p:sld>
 </file>
 
@@ -4411,13 +5338,20 @@
     </p:spTree>
     <p:extLst>
       <p:ext uri="{BB962C8B-B14F-4D97-AF65-F5344CB8AC3E}">
-        <p14:creationId xmlns:p14="http://schemas.microsoft.com/office/powerpoint/2010/main" xmlns="" val="4066989049"/>
+        <p14:creationId xmlns:p14="http://schemas.microsoft.com/office/powerpoint/2010/main" val="4066989049"/>
       </p:ext>
     </p:extLst>
   </p:cSld>
   <p:clrMapOvr>
     <a:masterClrMapping/>
   </p:clrMapOvr>
+  <p:timing>
+    <p:tnLst>
+      <p:par>
+        <p:cTn id="1" dur="indefinite" restart="never" nodeType="tmRoot"/>
+      </p:par>
+    </p:tnLst>
+  </p:timing>
 </p:sld>
 </file>
 
@@ -4440,38 +5374,30 @@
       </p:grpSpPr>
       <p:sp>
         <p:nvSpPr>
-          <p:cNvPr id="5" name="Rectangle 4"/>
-          <p:cNvSpPr/>
-          <p:nvPr/>
-        </p:nvSpPr>
-        <p:spPr>
-          <a:xfrm>
-            <a:off x="306055173" y="3382834"/>
-            <a:ext cx="0" cy="92333"/>
-          </a:xfrm>
-          <a:prstGeom prst="rect">
-            <a:avLst/>
-          </a:prstGeom>
-        </p:spPr>
-        <p:txBody>
-          <a:bodyPr wrap="none">
-            <a:spAutoFit/>
-          </a:bodyPr>
-          <a:lstStyle/>
-          <a:p>
-            <a:r>
-              <a:rPr lang="en-US" sz="2800" dirty="0" smtClean="0"/>
-              <a:t>Preprocessing -Steps -</a:t>
-            </a:r>
-            <a:endParaRPr lang="en-US" sz="2800" dirty="0"/>
-          </a:p>
-        </p:txBody>
-      </p:sp>
-      <p:sp>
-        <p:nvSpPr>
-          <p:cNvPr id="6" name="Content Placeholder 5"/>
+          <p:cNvPr id="2" name="Title 1"/>
+          <p:cNvSpPr>
+            <a:spLocks noGrp="1"/>
+          </p:cNvSpPr>
+          <p:nvPr>
+            <p:ph type="title"/>
+          </p:nvPr>
+        </p:nvSpPr>
+        <p:spPr/>
+        <p:txBody>
+          <a:bodyPr/>
+          <a:lstStyle/>
+          <a:p>
+            <a:r>
+              <a:rPr lang="en-US" dirty="0" smtClean="0"/>
+              <a:t>Project Goals</a:t>
+            </a:r>
+            <a:endParaRPr lang="en-US" dirty="0"/>
+          </a:p>
+        </p:txBody>
+      </p:sp>
+      <p:sp>
+        <p:nvSpPr>
+          <p:cNvPr id="3" name="Content Placeholder 2"/>
           <p:cNvSpPr>
             <a:spLocks noGrp="1"/>
           </p:cNvSpPr>
@@ -4485,80 +5411,48 @@
           <a:lstStyle/>
           <a:p>
             <a:r>
-              <a:rPr lang="en-US" sz="2800" dirty="0" smtClean="0"/>
-              <a:t>Motion correction</a:t>
-            </a:r>
-          </a:p>
-          <a:p>
-            <a:r>
-              <a:rPr lang="en-US" sz="2800" dirty="0" smtClean="0"/>
-              <a:t>Outlier detection</a:t>
-            </a:r>
-          </a:p>
-          <a:p>
-            <a:r>
-              <a:rPr lang="en-US" sz="2800" dirty="0" smtClean="0"/>
-              <a:t>Slice-timing correction</a:t>
-            </a:r>
-          </a:p>
-          <a:p>
-            <a:r>
-              <a:rPr lang="en-US" sz="2800" dirty="0" smtClean="0"/>
-              <a:t>Spatial filtering</a:t>
-            </a:r>
-          </a:p>
-          <a:p>
-            <a:r>
-              <a:rPr lang="en-US" sz="2800" dirty="0" smtClean="0"/>
-              <a:t>Temporal filtering</a:t>
-            </a:r>
-          </a:p>
-          <a:p>
-            <a:r>
-              <a:rPr lang="en-US" sz="2800" dirty="0" smtClean="0"/>
-              <a:t>Global intensity normalization</a:t>
-            </a:r>
-          </a:p>
-          <a:p>
-            <a:endParaRPr lang="en-US" sz="2800" dirty="0"/>
-          </a:p>
-        </p:txBody>
-      </p:sp>
-      <p:sp>
-        <p:nvSpPr>
-          <p:cNvPr id="7" name="TextBox 6"/>
-          <p:cNvSpPr txBox="1"/>
-          <p:nvPr/>
-        </p:nvSpPr>
-        <p:spPr>
-          <a:xfrm>
-            <a:off x="2459666" y="708837"/>
-            <a:ext cx="3877728" cy="646331"/>
-          </a:xfrm>
-          <a:prstGeom prst="rect">
-            <a:avLst/>
-          </a:prstGeom>
-          <a:noFill/>
-        </p:spPr>
-        <p:txBody>
-          <a:bodyPr wrap="none" rtlCol="0">
-            <a:spAutoFit/>
-          </a:bodyPr>
-          <a:lstStyle/>
-          <a:p>
-            <a:r>
-              <a:rPr lang="en-US" sz="3600" dirty="0" smtClean="0"/>
-              <a:t>Preprocessing steps</a:t>
-            </a:r>
-            <a:endParaRPr lang="en-US" sz="3600" dirty="0"/>
+              <a:rPr lang="en-US" dirty="0" smtClean="0"/>
+              <a:t>Contrast Image vs Word trials during encoding</a:t>
+            </a:r>
+          </a:p>
+          <a:p>
+            <a:r>
+              <a:rPr lang="en-US" dirty="0" smtClean="0"/>
+              <a:t>Contrast Hits vs False Alarms during recall</a:t>
+            </a:r>
+          </a:p>
+          <a:p>
+            <a:r>
+              <a:rPr lang="en-US" dirty="0" smtClean="0"/>
+              <a:t>Contrast Correct Rejections vs Omissions during recall</a:t>
+            </a:r>
+          </a:p>
+          <a:p>
+            <a:r>
+              <a:rPr lang="en-US" dirty="0" smtClean="0"/>
+              <a:t>Regress with Visual Imagery, Hallucination, and Delusion scores</a:t>
+            </a:r>
+            <a:endParaRPr lang="en-US" dirty="0"/>
           </a:p>
         </p:txBody>
       </p:sp>
     </p:spTree>
+    <p:extLst>
+      <p:ext uri="{BB962C8B-B14F-4D97-AF65-F5344CB8AC3E}">
+        <p14:creationId xmlns:p14="http://schemas.microsoft.com/office/powerpoint/2010/main" val="508429857"/>
+      </p:ext>
+    </p:extLst>
   </p:cSld>
   <p:clrMapOvr>
     <a:masterClrMapping/>
   </p:clrMapOvr>
+  <p:timing>
+    <p:tnLst>
+      <p:par>
+        <p:cTn id="1" dur="indefinite" restart="never" nodeType="tmRoot"/>
+      </p:par>
+    </p:tnLst>
+  </p:timing>
 </p:sld>
 </file>
 
@@ -4591,12 +5485,18 @@
         </p:nvSpPr>
         <p:spPr/>
         <p:txBody>
-          <a:bodyPr/>
-          <a:lstStyle/>
-          <a:p>
-            <a:r>
-              <a:rPr lang="en-US" dirty="0" smtClean="0"/>
-              <a:t>Analyses</a:t>
+          <a:bodyPr>
+            <a:normAutofit/>
+          </a:bodyPr>
+          <a:lstStyle/>
+          <a:p>
+            <a:r>
+              <a:rPr lang="en-US" dirty="0"/>
+              <a:t>Preprocessing </a:t>
+            </a:r>
+            <a:r>
+              <a:rPr lang="en-US" dirty="0" smtClean="0"/>
+              <a:t>steps (ROI analysis)</a:t>
             </a:r>
             <a:endParaRPr lang="en-US" dirty="0"/>
           </a:p>
@@ -4618,41 +5518,55 @@
           <a:lstStyle/>
           <a:p>
             <a:r>
-              <a:rPr lang="en-US" dirty="0" smtClean="0"/>
-              <a:t>Replicate control results from Stephan-Otto et al. (2016)</a:t>
-            </a:r>
-          </a:p>
-          <a:p>
-            <a:r>
-              <a:rPr lang="en-US" dirty="0" smtClean="0"/>
-              <a:t>Contrast Hits and False Alarms</a:t>
-            </a:r>
-          </a:p>
-          <a:p>
-            <a:r>
-              <a:rPr lang="en-US" dirty="0" smtClean="0"/>
-              <a:t>Contrast Correct Rejections and Omissions</a:t>
-            </a:r>
-          </a:p>
-          <a:p>
-            <a:r>
-              <a:rPr lang="en-US" dirty="0" smtClean="0"/>
-              <a:t>Correlate with Visual Imagery, Hallucination, and Delusion scores</a:t>
+              <a:rPr lang="en-US" dirty="0"/>
+              <a:t>Outlier </a:t>
+            </a:r>
+            <a:r>
+              <a:rPr lang="en-US" dirty="0" smtClean="0"/>
+              <a:t>detection</a:t>
+            </a:r>
+          </a:p>
+          <a:p>
+            <a:r>
+              <a:rPr lang="en-US" dirty="0"/>
+              <a:t>Slice-timing </a:t>
+            </a:r>
+            <a:r>
+              <a:rPr lang="en-US" dirty="0" smtClean="0"/>
+              <a:t>correction</a:t>
             </a:r>
             <a:endParaRPr lang="en-US" dirty="0"/>
+          </a:p>
+          <a:p>
+            <a:r>
+              <a:rPr lang="en-US" dirty="0"/>
+              <a:t>Motion </a:t>
+            </a:r>
+            <a:r>
+              <a:rPr lang="en-US" dirty="0" smtClean="0"/>
+              <a:t>correction</a:t>
+            </a:r>
+            <a:endParaRPr lang="en-US" dirty="0" smtClean="0"/>
           </a:p>
         </p:txBody>
       </p:sp>
     </p:spTree>
     <p:extLst>
       <p:ext uri="{BB962C8B-B14F-4D97-AF65-F5344CB8AC3E}">
-        <p14:creationId xmlns:p14="http://schemas.microsoft.com/office/powerpoint/2010/main" xmlns="" val="508429857"/>
+        <p14:creationId xmlns:p14="http://schemas.microsoft.com/office/powerpoint/2010/main" val="1073956429"/>
       </p:ext>
     </p:extLst>
   </p:cSld>
   <p:clrMapOvr>
     <a:masterClrMapping/>
   </p:clrMapOvr>
+  <p:timing>
+    <p:tnLst>
+      <p:par>
+        <p:cTn id="1" dur="indefinite" restart="never" nodeType="tmRoot"/>
+      </p:par>
+    </p:tnLst>
+  </p:timing>
 </p:sld>
 </file>
 
@@ -4974,4 +5888,265 @@
   </a:objectDefaults>
   <a:extraClrSchemeLst/>
 </a:theme>
+</file>
+
+<file path=ppt/theme/theme2.xml><?xml version="1.0" encoding="utf-8"?>
+<a:theme xmlns:a="http://schemas.openxmlformats.org/drawingml/2006/main" name="Office Theme">
+  <a:themeElements>
+    <a:clrScheme name="Office">
+      <a:dk1>
+        <a:sysClr val="windowText" lastClr="000000"/>
+      </a:dk1>
+      <a:lt1>
+        <a:sysClr val="window" lastClr="FFFFFF"/>
+      </a:lt1>
+      <a:dk2>
+        <a:srgbClr val="44546A"/>
+      </a:dk2>
+      <a:lt2>
+        <a:srgbClr val="E7E6E6"/>
+      </a:lt2>
+      <a:accent1>
+        <a:srgbClr val="5B9BD5"/>
+      </a:accent1>
+      <a:accent2>
+        <a:srgbClr val="ED7D31"/>
+      </a:accent2>
+      <a:accent3>
+        <a:srgbClr val="A5A5A5"/>
+      </a:accent3>
+      <a:accent4>
+        <a:srgbClr val="FFC000"/>
+      </a:accent4>
+      <a:accent5>
+        <a:srgbClr val="4472C4"/>
+      </a:accent5>
+      <a:accent6>
+        <a:srgbClr val="70AD47"/>
+      </a:accent6>
+      <a:hlink>
+        <a:srgbClr val="0563C1"/>
+      </a:hlink>
+      <a:folHlink>
+        <a:srgbClr val="954F72"/>
+      </a:folHlink>
+    </a:clrScheme>
+    <a:fontScheme name="Office">
+      <a:majorFont>
+        <a:latin typeface="Calibri Light" panose="020F0302020204030204"/>
+        <a:ea typeface=""/>
+        <a:cs typeface=""/>
+        <a:font script="Jpan" typeface="Yu Gothic Light"/>
+        <a:font script="Hang" typeface="맑은 고딕"/>
+        <a:font script="Hans" typeface="DengXian Light"/>
+        <a:font script="Hant" typeface="新細明體"/>
+        <a:font script="Arab" typeface="Times New Roman"/>
+        <a:font script="Hebr" typeface="Times New Roman"/>
+        <a:font script="Thai" typeface="Angsana New"/>
+        <a:font script="Ethi" typeface="Nyala"/>
+        <a:font script="Beng" typeface="Vrinda"/>
+        <a:font script="Gujr" typeface="Shruti"/>
+        <a:font script="Khmr" typeface="MoolBoran"/>
+        <a:font script="Knda" typeface="Tunga"/>
+        <a:font script="Guru" typeface="Raavi"/>
+        <a:font script="Cans" typeface="Euphemia"/>
+        <a:font script="Cher" typeface="Plantagenet Cherokee"/>
+        <a:font script="Yiii" typeface="Microsoft Yi Baiti"/>
+        <a:font script="Tibt" typeface="Microsoft Himalaya"/>
+        <a:font script="Thaa" typeface="MV Boli"/>
+        <a:font script="Deva" typeface="Mangal"/>
+        <a:font script="Telu" typeface="Gautami"/>
+        <a:font script="Taml" typeface="Latha"/>
+        <a:font script="Syrc" typeface="Estrangelo Edessa"/>
+        <a:font script="Orya" typeface="Kalinga"/>
+        <a:font script="Mlym" typeface="Kartika"/>
+        <a:font script="Laoo" typeface="DokChampa"/>
+        <a:font script="Sinh" typeface="Iskoola Pota"/>
+        <a:font script="Mong" typeface="Mongolian Baiti"/>
+        <a:font script="Viet" typeface="Times New Roman"/>
+        <a:font script="Uigh" typeface="Microsoft Uighur"/>
+        <a:font script="Geor" typeface="Sylfaen"/>
+      </a:majorFont>
+      <a:minorFont>
+        <a:latin typeface="Calibri" panose="020F0502020204030204"/>
+        <a:ea typeface=""/>
+        <a:cs typeface=""/>
+        <a:font script="Jpan" typeface="Yu Gothic"/>
+        <a:font script="Hang" typeface="맑은 고딕"/>
+        <a:font script="Hans" typeface="DengXian"/>
+        <a:font script="Hant" typeface="新細明體"/>
+        <a:font script="Arab" typeface="Arial"/>
+        <a:font script="Hebr" typeface="Arial"/>
+        <a:font script="Thai" typeface="Cordia New"/>
+        <a:font script="Ethi" typeface="Nyala"/>
+        <a:font script="Beng" typeface="Vrinda"/>
+        <a:font script="Gujr" typeface="Shruti"/>
+        <a:font script="Khmr" typeface="DaunPenh"/>
+        <a:font script="Knda" typeface="Tunga"/>
+        <a:font script="Guru" typeface="Raavi"/>
+        <a:font script="Cans" typeface="Euphemia"/>
+        <a:font script="Cher" typeface="Plantagenet Cherokee"/>
+        <a:font script="Yiii" typeface="Microsoft Yi Baiti"/>
+        <a:font script="Tibt" typeface="Microsoft Himalaya"/>
+        <a:font script="Thaa" typeface="MV Boli"/>
+        <a:font script="Deva" typeface="Mangal"/>
+        <a:font script="Telu" typeface="Gautami"/>
+        <a:font script="Taml" typeface="Latha"/>
+        <a:font script="Syrc" typeface="Estrangelo Edessa"/>
+        <a:font script="Orya" typeface="Kalinga"/>
+        <a:font script="Mlym" typeface="Kartika"/>
+        <a:font script="Laoo" typeface="DokChampa"/>
+        <a:font script="Sinh" typeface="Iskoola Pota"/>
+        <a:font script="Mong" typeface="Mongolian Baiti"/>
+        <a:font script="Viet" typeface="Arial"/>
+        <a:font script="Uigh" typeface="Microsoft Uighur"/>
+        <a:font script="Geor" typeface="Sylfaen"/>
+      </a:minorFont>
+    </a:fontScheme>
+    <a:fmtScheme name="Office">
+      <a:fillStyleLst>
+        <a:solidFill>
+          <a:schemeClr val="phClr"/>
+        </a:solidFill>
+        <a:gradFill rotWithShape="1">
+          <a:gsLst>
+            <a:gs pos="0">
+              <a:schemeClr val="phClr">
+                <a:lumMod val="110000"/>
+                <a:satMod val="105000"/>
+                <a:tint val="67000"/>
+              </a:schemeClr>
+            </a:gs>
+            <a:gs pos="50000">
+              <a:schemeClr val="phClr">
+                <a:lumMod val="105000"/>
+                <a:satMod val="103000"/>
+                <a:tint val="73000"/>
+              </a:schemeClr>
+            </a:gs>
+            <a:gs pos="100000">
+              <a:schemeClr val="phClr">
+                <a:lumMod val="105000"/>
+                <a:satMod val="109000"/>
+                <a:tint val="81000"/>
+              </a:schemeClr>
+            </a:gs>
+          </a:gsLst>
+          <a:lin ang="5400000" scaled="0"/>
+        </a:gradFill>
+        <a:gradFill rotWithShape="1">
+          <a:gsLst>
+            <a:gs pos="0">
+              <a:schemeClr val="phClr">
+                <a:satMod val="103000"/>
+                <a:lumMod val="102000"/>
+                <a:tint val="94000"/>
+              </a:schemeClr>
+            </a:gs>
+            <a:gs pos="50000">
+              <a:schemeClr val="phClr">
+                <a:satMod val="110000"/>
+                <a:lumMod val="100000"/>
+                <a:shade val="100000"/>
+              </a:schemeClr>
+            </a:gs>
+            <a:gs pos="100000">
+              <a:schemeClr val="phClr">
+                <a:lumMod val="99000"/>
+                <a:satMod val="120000"/>
+                <a:shade val="78000"/>
+              </a:schemeClr>
+            </a:gs>
+          </a:gsLst>
+          <a:lin ang="5400000" scaled="0"/>
+        </a:gradFill>
+      </a:fillStyleLst>
+      <a:lnStyleLst>
+        <a:ln w="6350" cap="flat" cmpd="sng" algn="ctr">
+          <a:solidFill>
+            <a:schemeClr val="phClr"/>
+          </a:solidFill>
+          <a:prstDash val="solid"/>
+          <a:miter lim="800000"/>
+        </a:ln>
+        <a:ln w="12700" cap="flat" cmpd="sng" algn="ctr">
+          <a:solidFill>
+            <a:schemeClr val="phClr"/>
+          </a:solidFill>
+          <a:prstDash val="solid"/>
+          <a:miter lim="800000"/>
+        </a:ln>
+        <a:ln w="19050" cap="flat" cmpd="sng" algn="ctr">
+          <a:solidFill>
+            <a:schemeClr val="phClr"/>
+          </a:solidFill>
+          <a:prstDash val="solid"/>
+          <a:miter lim="800000"/>
+        </a:ln>
+      </a:lnStyleLst>
+      <a:effectStyleLst>
+        <a:effectStyle>
+          <a:effectLst/>
+        </a:effectStyle>
+        <a:effectStyle>
+          <a:effectLst/>
+        </a:effectStyle>
+        <a:effectStyle>
+          <a:effectLst>
+            <a:outerShdw blurRad="57150" dist="19050" dir="5400000" algn="ctr" rotWithShape="0">
+              <a:srgbClr val="000000">
+                <a:alpha val="63000"/>
+              </a:srgbClr>
+            </a:outerShdw>
+          </a:effectLst>
+        </a:effectStyle>
+      </a:effectStyleLst>
+      <a:bgFillStyleLst>
+        <a:solidFill>
+          <a:schemeClr val="phClr"/>
+        </a:solidFill>
+        <a:solidFill>
+          <a:schemeClr val="phClr">
+            <a:tint val="95000"/>
+            <a:satMod val="170000"/>
+          </a:schemeClr>
+        </a:solidFill>
+        <a:gradFill rotWithShape="1">
+          <a:gsLst>
+            <a:gs pos="0">
+              <a:schemeClr val="phClr">
+                <a:tint val="93000"/>
+                <a:satMod val="150000"/>
+                <a:shade val="98000"/>
+                <a:lumMod val="102000"/>
+              </a:schemeClr>
+            </a:gs>
+            <a:gs pos="50000">
+              <a:schemeClr val="phClr">
+                <a:tint val="98000"/>
+                <a:satMod val="130000"/>
+                <a:shade val="90000"/>
+                <a:lumMod val="103000"/>
+              </a:schemeClr>
+            </a:gs>
+            <a:gs pos="100000">
+              <a:schemeClr val="phClr">
+                <a:shade val="63000"/>
+                <a:satMod val="120000"/>
+              </a:schemeClr>
+            </a:gs>
+          </a:gsLst>
+          <a:lin ang="5400000" scaled="0"/>
+        </a:gradFill>
+      </a:bgFillStyleLst>
+    </a:fmtScheme>
+  </a:themeElements>
+  <a:objectDefaults/>
+  <a:extraClrSchemeLst/>
+  <a:extLst>
+    <a:ext uri="{05A4C25C-085E-4340-85A3-A5531E510DB2}">
+      <thm15:themeFamily xmlns:thm15="http://schemas.microsoft.com/office/thememl/2012/main" name="Office Theme" id="{62F939B6-93AF-4DB8-9C6B-D6C7DFDC589F}" vid="{4A3C46E8-61CC-4603-A589-7422A47A8E4A}"/>
+    </a:ext>
+  </a:extLst>
+</a:theme>
 </file>
</xml_diff>